<commit_message>
updated UG for first launch
</commit_message>
<xml_diff>
--- a/docs/diagrams/SetGoalSequenceDiagram.pptx
+++ b/docs/diagrams/SetGoalSequenceDiagram.pptx
@@ -5,11 +5,10 @@
     <p:sldMasterId id="2147483648" r:id="rId1"/>
   </p:sldMasterIdLst>
   <p:notesMasterIdLst>
-    <p:notesMasterId r:id="rId4"/>
+    <p:notesMasterId r:id="rId3"/>
   </p:notesMasterIdLst>
   <p:sldIdLst>
-    <p:sldId id="267" r:id="rId2"/>
-    <p:sldId id="268" r:id="rId3"/>
+    <p:sldId id="268" r:id="rId2"/>
   </p:sldIdLst>
   <p:sldSz cx="18000663" cy="6911975"/>
   <p:notesSz cx="6858000" cy="9144000"/>
@@ -209,7 +208,7 @@
           <a:p>
             <a:fld id="{F5CC4B3F-88C1-4FFA-B1B6-F41C21DC6924}" type="datetimeFigureOut">
               <a:rPr lang="en-US" smtClean="0"/>
-              <a:t>4/2/2019</a:t>
+              <a:t>4/14/2019</a:t>
             </a:fld>
             <a:endParaRPr lang="en-US"/>
           </a:p>
@@ -655,7 +654,7 @@
           <a:p>
             <a:fld id="{78C97017-6FC3-485B-9764-EAC9E56C1D49}" type="datetimeFigureOut">
               <a:rPr lang="en-US" smtClean="0"/>
-              <a:t>4/2/2019</a:t>
+              <a:t>4/14/2019</a:t>
             </a:fld>
             <a:endParaRPr lang="en-US"/>
           </a:p>
@@ -823,7 +822,7 @@
           <a:p>
             <a:fld id="{78C97017-6FC3-485B-9764-EAC9E56C1D49}" type="datetimeFigureOut">
               <a:rPr lang="en-US" smtClean="0"/>
-              <a:t>4/2/2019</a:t>
+              <a:t>4/14/2019</a:t>
             </a:fld>
             <a:endParaRPr lang="en-US"/>
           </a:p>
@@ -1001,7 +1000,7 @@
           <a:p>
             <a:fld id="{78C97017-6FC3-485B-9764-EAC9E56C1D49}" type="datetimeFigureOut">
               <a:rPr lang="en-US" smtClean="0"/>
-              <a:t>4/2/2019</a:t>
+              <a:t>4/14/2019</a:t>
             </a:fld>
             <a:endParaRPr lang="en-US"/>
           </a:p>
@@ -1169,7 +1168,7 @@
           <a:p>
             <a:fld id="{78C97017-6FC3-485B-9764-EAC9E56C1D49}" type="datetimeFigureOut">
               <a:rPr lang="en-US" smtClean="0"/>
-              <a:t>4/2/2019</a:t>
+              <a:t>4/14/2019</a:t>
             </a:fld>
             <a:endParaRPr lang="en-US"/>
           </a:p>
@@ -1414,7 +1413,7 @@
           <a:p>
             <a:fld id="{78C97017-6FC3-485B-9764-EAC9E56C1D49}" type="datetimeFigureOut">
               <a:rPr lang="en-US" smtClean="0"/>
-              <a:t>4/2/2019</a:t>
+              <a:t>4/14/2019</a:t>
             </a:fld>
             <a:endParaRPr lang="en-US"/>
           </a:p>
@@ -1699,7 +1698,7 @@
           <a:p>
             <a:fld id="{78C97017-6FC3-485B-9764-EAC9E56C1D49}" type="datetimeFigureOut">
               <a:rPr lang="en-US" smtClean="0"/>
-              <a:t>4/2/2019</a:t>
+              <a:t>4/14/2019</a:t>
             </a:fld>
             <a:endParaRPr lang="en-US"/>
           </a:p>
@@ -2118,7 +2117,7 @@
           <a:p>
             <a:fld id="{78C97017-6FC3-485B-9764-EAC9E56C1D49}" type="datetimeFigureOut">
               <a:rPr lang="en-US" smtClean="0"/>
-              <a:t>4/2/2019</a:t>
+              <a:t>4/14/2019</a:t>
             </a:fld>
             <a:endParaRPr lang="en-US"/>
           </a:p>
@@ -2235,7 +2234,7 @@
           <a:p>
             <a:fld id="{78C97017-6FC3-485B-9764-EAC9E56C1D49}" type="datetimeFigureOut">
               <a:rPr lang="en-US" smtClean="0"/>
-              <a:t>4/2/2019</a:t>
+              <a:t>4/14/2019</a:t>
             </a:fld>
             <a:endParaRPr lang="en-US"/>
           </a:p>
@@ -2330,7 +2329,7 @@
           <a:p>
             <a:fld id="{78C97017-6FC3-485B-9764-EAC9E56C1D49}" type="datetimeFigureOut">
               <a:rPr lang="en-US" smtClean="0"/>
-              <a:t>4/2/2019</a:t>
+              <a:t>4/14/2019</a:t>
             </a:fld>
             <a:endParaRPr lang="en-US"/>
           </a:p>
@@ -2605,7 +2604,7 @@
           <a:p>
             <a:fld id="{78C97017-6FC3-485B-9764-EAC9E56C1D49}" type="datetimeFigureOut">
               <a:rPr lang="en-US" smtClean="0"/>
-              <a:t>4/2/2019</a:t>
+              <a:t>4/14/2019</a:t>
             </a:fld>
             <a:endParaRPr lang="en-US"/>
           </a:p>
@@ -2857,7 +2856,7 @@
           <a:p>
             <a:fld id="{78C97017-6FC3-485B-9764-EAC9E56C1D49}" type="datetimeFigureOut">
               <a:rPr lang="en-US" smtClean="0"/>
-              <a:t>4/2/2019</a:t>
+              <a:t>4/14/2019</a:t>
             </a:fld>
             <a:endParaRPr lang="en-US"/>
           </a:p>
@@ -3068,7 +3067,7 @@
           <a:p>
             <a:fld id="{78C97017-6FC3-485B-9764-EAC9E56C1D49}" type="datetimeFigureOut">
               <a:rPr lang="en-US" smtClean="0"/>
-              <a:t>4/2/2019</a:t>
+              <a:t>4/14/2019</a:t>
             </a:fld>
             <a:endParaRPr lang="en-US"/>
           </a:p>
@@ -3451,8 +3450,8 @@
         </p:nvSpPr>
         <p:spPr>
           <a:xfrm>
-            <a:off x="10887710" y="145882"/>
-            <a:ext cx="3903825" cy="4400926"/>
+            <a:off x="12575015" y="136738"/>
+            <a:ext cx="3903825" cy="5665354"/>
           </a:xfrm>
           <a:prstGeom prst="roundRect">
             <a:avLst>
@@ -3512,8 +3511,8 @@
         </p:nvSpPr>
         <p:spPr>
           <a:xfrm>
-            <a:off x="4896144" y="136739"/>
-            <a:ext cx="5863964" cy="4343400"/>
+            <a:off x="2980531" y="136743"/>
+            <a:ext cx="9524948" cy="6519621"/>
           </a:xfrm>
           <a:prstGeom prst="roundRect">
             <a:avLst>
@@ -3573,7 +3572,7 @@
         </p:nvSpPr>
         <p:spPr>
           <a:xfrm>
-            <a:off x="5311481" y="570933"/>
+            <a:off x="3395868" y="570933"/>
             <a:ext cx="1455629" cy="346760"/>
           </a:xfrm>
           <a:prstGeom prst="rect">
@@ -3642,7 +3641,7 @@
         </p:nvCxnSpPr>
         <p:spPr>
           <a:xfrm>
-            <a:off x="6039290" y="934609"/>
+            <a:off x="4123677" y="934609"/>
             <a:ext cx="0" cy="3481399"/>
           </a:xfrm>
           <a:prstGeom prst="line">
@@ -3679,8 +3678,8 @@
         </p:nvSpPr>
         <p:spPr>
           <a:xfrm>
-            <a:off x="5967282" y="1285303"/>
-            <a:ext cx="152400" cy="2932689"/>
+            <a:off x="4051674" y="1285302"/>
+            <a:ext cx="172591" cy="5073953"/>
           </a:xfrm>
           <a:prstGeom prst="rect">
             <a:avLst/>
@@ -3726,7 +3725,7 @@
         </p:nvSpPr>
         <p:spPr>
           <a:xfrm>
-            <a:off x="7781138" y="450009"/>
+            <a:off x="5865525" y="450009"/>
             <a:ext cx="1387962" cy="467684"/>
           </a:xfrm>
           <a:prstGeom prst="rect">
@@ -3795,7 +3794,7 @@
         </p:nvCxnSpPr>
         <p:spPr>
           <a:xfrm>
-            <a:off x="8478918" y="934604"/>
+            <a:off x="6563305" y="934604"/>
             <a:ext cx="0" cy="1482984"/>
           </a:xfrm>
           <a:prstGeom prst="line">
@@ -3832,8 +3831,8 @@
         </p:nvSpPr>
         <p:spPr>
           <a:xfrm>
-            <a:off x="8406911" y="1392797"/>
-            <a:ext cx="154408" cy="767790"/>
+            <a:off x="6491298" y="1392800"/>
+            <a:ext cx="157380" cy="2367985"/>
           </a:xfrm>
           <a:prstGeom prst="rect">
             <a:avLst/>
@@ -3877,14 +3876,13 @@
           <p:cNvCxnSpPr>
             <a:cxnSpLocks/>
             <a:stCxn id="21" idx="0"/>
-            <a:endCxn id="4" idx="0"/>
           </p:cNvCxnSpPr>
           <p:nvPr/>
         </p:nvCxnSpPr>
         <p:spPr>
           <a:xfrm>
-            <a:off x="10030413" y="1640620"/>
-            <a:ext cx="0" cy="2644578"/>
+            <a:off x="8367792" y="1662174"/>
+            <a:ext cx="3784" cy="2159273"/>
           </a:xfrm>
           <a:prstGeom prst="line">
             <a:avLst/>
@@ -3920,7 +3918,7 @@
         </p:nvSpPr>
         <p:spPr>
           <a:xfrm>
-            <a:off x="9954213" y="1640625"/>
+            <a:off x="8291592" y="1662174"/>
             <a:ext cx="152400" cy="276003"/>
           </a:xfrm>
           <a:prstGeom prst="rect">
@@ -3967,7 +3965,7 @@
         </p:nvCxnSpPr>
         <p:spPr>
           <a:xfrm>
-            <a:off x="4847436" y="1288986"/>
+            <a:off x="2931823" y="1288986"/>
             <a:ext cx="1119851" cy="0"/>
           </a:xfrm>
           <a:prstGeom prst="straightConnector1">
@@ -4003,7 +4001,7 @@
         </p:nvSpPr>
         <p:spPr>
           <a:xfrm>
-            <a:off x="4199733" y="1017587"/>
+            <a:off x="2284120" y="1017587"/>
             <a:ext cx="1691544" cy="215444"/>
           </a:xfrm>
           <a:prstGeom prst="rect">
@@ -4053,7 +4051,7 @@
         </p:nvCxnSpPr>
         <p:spPr>
           <a:xfrm flipV="1">
-            <a:off x="8564303" y="1539332"/>
+            <a:off x="6648690" y="1539332"/>
             <a:ext cx="922392" cy="1"/>
           </a:xfrm>
           <a:prstGeom prst="straightConnector1">
@@ -4089,7 +4087,7 @@
         </p:nvSpPr>
         <p:spPr>
           <a:xfrm>
-            <a:off x="7671757" y="2511058"/>
+            <a:off x="6825587" y="4230301"/>
             <a:ext cx="855809" cy="215444"/>
           </a:xfrm>
           <a:prstGeom prst="rect">
@@ -4124,13 +4122,16 @@
       <p:cxnSp>
         <p:nvCxnSpPr>
           <p:cNvPr id="34" name="Straight Arrow Connector 33"/>
-          <p:cNvCxnSpPr/>
+          <p:cNvCxnSpPr>
+            <a:cxnSpLocks/>
+            <a:endCxn id="21" idx="2"/>
+          </p:cNvCxnSpPr>
           <p:nvPr/>
         </p:nvCxnSpPr>
         <p:spPr>
-          <a:xfrm>
-            <a:off x="8537439" y="1905219"/>
-            <a:ext cx="1492974" cy="0"/>
+          <a:xfrm flipV="1">
+            <a:off x="6635318" y="1938172"/>
+            <a:ext cx="1732479" cy="3210"/>
           </a:xfrm>
           <a:prstGeom prst="straightConnector1">
             <a:avLst/>
@@ -4169,7 +4170,7 @@
         </p:nvCxnSpPr>
         <p:spPr>
           <a:xfrm>
-            <a:off x="6119687" y="2160587"/>
+            <a:off x="4204074" y="3760780"/>
             <a:ext cx="2348067" cy="0"/>
           </a:xfrm>
           <a:prstGeom prst="straightConnector1">
@@ -4207,7 +4208,7 @@
         </p:nvCxnSpPr>
         <p:spPr>
           <a:xfrm>
-            <a:off x="4809335" y="4217987"/>
+            <a:off x="2856483" y="6358929"/>
             <a:ext cx="1196051" cy="0"/>
           </a:xfrm>
           <a:prstGeom prst="straightConnector1">
@@ -4245,8 +4246,8 @@
         </p:nvSpPr>
         <p:spPr>
           <a:xfrm>
-            <a:off x="9954819" y="2758305"/>
-            <a:ext cx="161322" cy="1307285"/>
+            <a:off x="10125422" y="4455338"/>
+            <a:ext cx="168215" cy="1903924"/>
           </a:xfrm>
           <a:prstGeom prst="rect">
             <a:avLst/>
@@ -4292,7 +4293,7 @@
         </p:nvSpPr>
         <p:spPr>
           <a:xfrm>
-            <a:off x="10079879" y="2775233"/>
+            <a:off x="10247956" y="4232543"/>
             <a:ext cx="1298078" cy="184666"/>
           </a:xfrm>
           <a:prstGeom prst="rect">
@@ -4325,15 +4326,7 @@
                   </a:schemeClr>
                 </a:solidFill>
               </a:rPr>
-              <a:t>undo</a:t>
-            </a:r>
-            <a:r>
-              <a:rPr lang="en-US" sz="1200" dirty="0" err="1">
-                <a:solidFill>
-                  <a:srgbClr val="7030A0"/>
-                </a:solidFill>
-              </a:rPr>
-              <a:t>AddressBook</a:t>
+              <a:t>setGoal</a:t>
             </a:r>
             <a:r>
               <a:rPr lang="en-US" sz="1200" dirty="0">
@@ -4341,7 +4334,7 @@
                   <a:srgbClr val="7030A0"/>
                 </a:solidFill>
               </a:rPr>
-              <a:t>()</a:t>
+              <a:t>(g)</a:t>
             </a:r>
             <a:endParaRPr lang="en-US" sz="1200" dirty="0"/>
           </a:p>
@@ -4355,7 +4348,7 @@
         </p:nvSpPr>
         <p:spPr>
           <a:xfrm>
-            <a:off x="6218855" y="1133137"/>
+            <a:off x="4303242" y="1133137"/>
             <a:ext cx="2139871" cy="215444"/>
           </a:xfrm>
           <a:prstGeom prst="rect">
@@ -4407,7 +4400,7 @@
         </p:nvSpPr>
         <p:spPr>
           <a:xfrm>
-            <a:off x="7701086" y="3818063"/>
+            <a:off x="6770823" y="6090941"/>
             <a:ext cx="621216" cy="215444"/>
           </a:xfrm>
           <a:prstGeom prst="rect">
@@ -4447,7 +4440,7 @@
         </p:nvSpPr>
         <p:spPr>
           <a:xfrm>
-            <a:off x="5073601" y="3972888"/>
+            <a:off x="3120749" y="6113830"/>
             <a:ext cx="762000" cy="215444"/>
           </a:xfrm>
           <a:prstGeom prst="rect">
@@ -4487,8 +4480,8 @@
         </p:nvSpPr>
         <p:spPr>
           <a:xfrm>
-            <a:off x="11925491" y="2595598"/>
-            <a:ext cx="2181777" cy="335427"/>
+            <a:off x="14219743" y="4308778"/>
+            <a:ext cx="967878" cy="335427"/>
           </a:xfrm>
           <a:prstGeom prst="rect">
             <a:avLst/>
@@ -4536,7 +4529,7 @@
                   <a:schemeClr val="bg1"/>
                 </a:solidFill>
               </a:rPr>
-              <a:t>VersionedAddressBook</a:t>
+              <a:t>EPiggy</a:t>
             </a:r>
             <a:endParaRPr lang="en-SG" sz="1600" dirty="0">
               <a:solidFill>
@@ -4554,7 +4547,7 @@
         </p:nvSpPr>
         <p:spPr>
           <a:xfrm>
-            <a:off x="12942543" y="3209827"/>
+            <a:off x="14629848" y="4923007"/>
             <a:ext cx="129933" cy="398562"/>
           </a:xfrm>
           <a:prstGeom prst="rect">
@@ -4601,7 +4594,7 @@
         </p:nvSpPr>
         <p:spPr>
           <a:xfrm>
-            <a:off x="10978096" y="2389187"/>
+            <a:off x="12665403" y="533761"/>
             <a:ext cx="841636" cy="300180"/>
           </a:xfrm>
           <a:prstGeom prst="rect">
@@ -4657,13 +4650,14 @@
           <p:cNvPr id="46" name="Straight Connector 45"/>
           <p:cNvCxnSpPr>
             <a:cxnSpLocks/>
+            <a:stCxn id="40" idx="2"/>
           </p:cNvCxnSpPr>
           <p:nvPr/>
         </p:nvCxnSpPr>
         <p:spPr>
-          <a:xfrm flipH="1">
-            <a:off x="11414827" y="2680293"/>
-            <a:ext cx="3959" cy="1735710"/>
+          <a:xfrm>
+            <a:off x="13086221" y="833941"/>
+            <a:ext cx="0" cy="4706446"/>
           </a:xfrm>
           <a:prstGeom prst="line">
             <a:avLst/>
@@ -4699,8 +4693,8 @@
         </p:nvSpPr>
         <p:spPr>
           <a:xfrm>
-            <a:off x="11315858" y="2985098"/>
-            <a:ext cx="168896" cy="775693"/>
+            <a:off x="13003165" y="4445745"/>
+            <a:ext cx="156464" cy="915242"/>
           </a:xfrm>
           <a:prstGeom prst="rect">
             <a:avLst/>
@@ -4734,7 +4728,7 @@
           <a:lstStyle/>
           <a:p>
             <a:pPr algn="ctr"/>
-            <a:endParaRPr lang="en-SG" sz="1400"/>
+            <a:endParaRPr lang="en-SG" sz="1400" dirty="0"/>
           </a:p>
         </p:txBody>
       </p:sp>
@@ -4748,8 +4742,8 @@
         </p:nvCxnSpPr>
         <p:spPr>
           <a:xfrm>
-            <a:off x="10114091" y="3002331"/>
-            <a:ext cx="1210345" cy="0"/>
+            <a:off x="10282163" y="4459643"/>
+            <a:ext cx="2724876" cy="0"/>
           </a:xfrm>
           <a:prstGeom prst="straightConnector1">
             <a:avLst/>
@@ -4784,7 +4778,7 @@
         </p:nvSpPr>
         <p:spPr>
           <a:xfrm>
-            <a:off x="9901211" y="4285198"/>
+            <a:off x="8237147" y="3807837"/>
             <a:ext cx="258404" cy="261610"/>
           </a:xfrm>
           <a:prstGeom prst="rect">
@@ -4817,7 +4811,7 @@
         </p:nvSpPr>
         <p:spPr>
           <a:xfrm>
-            <a:off x="9464312" y="1287255"/>
+            <a:off x="7571087" y="1244747"/>
             <a:ext cx="1593421" cy="461538"/>
           </a:xfrm>
           <a:prstGeom prst="rect">
@@ -4858,21 +4852,8 @@
                   <a:schemeClr val="bg1"/>
                 </a:solidFill>
               </a:rPr>
-              <a:t>:</a:t>
-            </a:r>
-            <a:r>
-              <a:rPr lang="en-US" sz="1600" dirty="0" err="1">
-                <a:solidFill>
-                  <a:schemeClr val="bg1"/>
-                </a:solidFill>
-              </a:rPr>
-              <a:t>SetGoal</a:t>
-            </a:r>
-            <a:endParaRPr lang="en-US" sz="1600" dirty="0">
-              <a:solidFill>
-                <a:schemeClr val="bg1"/>
-              </a:solidFill>
-            </a:endParaRPr>
+              <a:t>:SetGoal</a:t>
+            </a:r>
           </a:p>
           <a:p>
             <a:pPr algn="ctr"/>
@@ -4897,7 +4878,7 @@
           <p:cNvPr id="66" name="Straight Arrow Connector 65">
             <a:extLst>
               <a:ext uri="{FF2B5EF4-FFF2-40B4-BE49-F238E27FC236}">
-                <a16:creationId xmlns:a16="http://schemas.microsoft.com/office/drawing/2014/main" id="{39916E2E-195A-4DC8-B025-B05FA87E6796}"/>
+                <a16:creationId xmlns:a16="http://schemas.microsoft.com/office/drawing/2014/main" xmlns="" id="{39916E2E-195A-4DC8-B025-B05FA87E6796}"/>
               </a:ext>
             </a:extLst>
           </p:cNvPr>
@@ -4908,8 +4889,8 @@
         </p:nvCxnSpPr>
         <p:spPr>
           <a:xfrm>
-            <a:off x="6119682" y="2758306"/>
-            <a:ext cx="3832164" cy="1"/>
+            <a:off x="4204069" y="4480625"/>
+            <a:ext cx="5928062" cy="0"/>
           </a:xfrm>
           <a:prstGeom prst="straightConnector1">
             <a:avLst/>
@@ -4941,7 +4922,7 @@
           <p:cNvPr id="67" name="Straight Arrow Connector 66">
             <a:extLst>
               <a:ext uri="{FF2B5EF4-FFF2-40B4-BE49-F238E27FC236}">
-                <a16:creationId xmlns:a16="http://schemas.microsoft.com/office/drawing/2014/main" id="{D881596E-177C-4FDC-8E60-CAB90B3D5FAB}"/>
+                <a16:creationId xmlns:a16="http://schemas.microsoft.com/office/drawing/2014/main" xmlns="" id="{D881596E-177C-4FDC-8E60-CAB90B3D5FAB}"/>
               </a:ext>
             </a:extLst>
           </p:cNvPr>
@@ -4952,7 +4933,7 @@
         </p:nvCxnSpPr>
         <p:spPr>
           <a:xfrm>
-            <a:off x="6136581" y="1390910"/>
+            <a:off x="4220968" y="1390910"/>
             <a:ext cx="2256705" cy="1"/>
           </a:xfrm>
           <a:prstGeom prst="straightConnector1">
@@ -4985,7 +4966,7 @@
           <p:cNvPr id="69" name="Straight Arrow Connector 68">
             <a:extLst>
               <a:ext uri="{FF2B5EF4-FFF2-40B4-BE49-F238E27FC236}">
-                <a16:creationId xmlns:a16="http://schemas.microsoft.com/office/drawing/2014/main" id="{7C9F21BC-13A9-471F-825A-2621FD36355F}"/>
+                <a16:creationId xmlns:a16="http://schemas.microsoft.com/office/drawing/2014/main" xmlns="" id="{7C9F21BC-13A9-471F-825A-2621FD36355F}"/>
               </a:ext>
             </a:extLst>
           </p:cNvPr>
@@ -4996,8 +4977,8 @@
         </p:nvCxnSpPr>
         <p:spPr>
           <a:xfrm>
-            <a:off x="6120334" y="4063449"/>
-            <a:ext cx="3831517" cy="0"/>
+            <a:off x="4220968" y="6359262"/>
+            <a:ext cx="6002775" cy="0"/>
           </a:xfrm>
           <a:prstGeom prst="straightConnector1">
             <a:avLst/>
@@ -5026,27 +5007,69 @@
           </a:fontRef>
         </p:style>
       </p:cxnSp>
-      <p:sp>
-        <p:nvSpPr>
-          <p:cNvPr id="88" name="TextBox 87">
+      <p:cxnSp>
+        <p:nvCxnSpPr>
+          <p:cNvPr id="89" name="Straight Connector 88">
             <a:extLst>
               <a:ext uri="{FF2B5EF4-FFF2-40B4-BE49-F238E27FC236}">
-                <a16:creationId xmlns:a16="http://schemas.microsoft.com/office/drawing/2014/main" id="{B85C6184-7378-4E89-A338-72B1E5056F4F}"/>
+                <a16:creationId xmlns:a16="http://schemas.microsoft.com/office/drawing/2014/main" xmlns="" id="{E4E1C8CA-49DF-45D8-80A5-D5C8282EE927}"/>
               </a:ext>
             </a:extLst>
           </p:cNvPr>
+          <p:cNvCxnSpPr>
+            <a:cxnSpLocks/>
+          </p:cNvCxnSpPr>
+          <p:nvPr/>
+        </p:nvCxnSpPr>
+        <p:spPr>
+          <a:xfrm flipH="1">
+            <a:off x="14703255" y="4611522"/>
+            <a:ext cx="429" cy="915242"/>
+          </a:xfrm>
+          <a:prstGeom prst="line">
+            <a:avLst/>
+          </a:prstGeom>
+          <a:ln w="19050">
+            <a:solidFill>
+              <a:srgbClr val="7030A0"/>
+            </a:solidFill>
+            <a:prstDash val="sysDash"/>
+          </a:ln>
+          <a:effectLst/>
+        </p:spPr>
+        <p:style>
+          <a:lnRef idx="1">
+            <a:schemeClr val="accent1"/>
+          </a:lnRef>
+          <a:fillRef idx="2">
+            <a:schemeClr val="accent1"/>
+          </a:fillRef>
+          <a:effectRef idx="1">
+            <a:schemeClr val="accent1"/>
+          </a:effectRef>
+          <a:fontRef idx="minor">
+            <a:schemeClr val="dk1"/>
+          </a:fontRef>
+        </p:style>
+      </p:cxnSp>
+      <p:sp>
+        <p:nvSpPr>
+          <p:cNvPr id="41" name="TextBox 40"/>
           <p:cNvSpPr txBox="1"/>
           <p:nvPr/>
         </p:nvSpPr>
         <p:spPr>
           <a:xfrm>
-            <a:off x="13197861" y="3294324"/>
-            <a:ext cx="2120786" cy="184666"/>
+            <a:off x="13507042" y="4715511"/>
+            <a:ext cx="827977" cy="184666"/>
           </a:xfrm>
           <a:prstGeom prst="rect">
             <a:avLst/>
           </a:prstGeom>
           <a:noFill/>
+          <a:ln>
+            <a:noFill/>
+          </a:ln>
         </p:spPr>
         <p:txBody>
           <a:bodyPr wrap="square" lIns="0" tIns="0" rIns="0" bIns="0" rtlCol="0">
@@ -5071,42 +5094,65 @@
                   <a:srgbClr val="7030A0"/>
                 </a:solidFill>
               </a:rPr>
-              <a:t>resetData</a:t>
+              <a:t>setGoal</a:t>
             </a:r>
             <a:r>
               <a:rPr lang="en-US" sz="1200" dirty="0">
                 <a:solidFill>
-                  <a:srgbClr val="7030A0"/>
+                  <a:schemeClr val="accent4">
+                    <a:lumMod val="75000"/>
+                  </a:schemeClr>
                 </a:solidFill>
               </a:rPr>
-              <a:t>(</a:t>
-            </a:r>
-            <a:r>
-              <a:rPr lang="en-US" sz="1200" dirty="0" err="1">
-                <a:solidFill>
-                  <a:srgbClr val="7030A0"/>
-                </a:solidFill>
-              </a:rPr>
-              <a:t>ReadOnlyAddressBook</a:t>
-            </a:r>
-            <a:r>
-              <a:rPr lang="en-US" sz="1200" dirty="0">
-                <a:solidFill>
-                  <a:srgbClr val="7030A0"/>
-                </a:solidFill>
-              </a:rPr>
-              <a:t>)</a:t>
-            </a:r>
-            <a:endParaRPr lang="en-US" sz="1200" dirty="0"/>
+              <a:t>()</a:t>
+            </a:r>
           </a:p>
         </p:txBody>
       </p:sp>
       <p:cxnSp>
         <p:nvCxnSpPr>
-          <p:cNvPr id="89" name="Straight Connector 88">
+          <p:cNvPr id="52" name="Straight Arrow Connector 51"/>
+          <p:cNvCxnSpPr>
+            <a:cxnSpLocks/>
+          </p:cNvCxnSpPr>
+          <p:nvPr/>
+        </p:nvCxnSpPr>
+        <p:spPr>
+          <a:xfrm>
+            <a:off x="13159629" y="4923006"/>
+            <a:ext cx="1470216" cy="0"/>
+          </a:xfrm>
+          <a:prstGeom prst="straightConnector1">
+            <a:avLst/>
+          </a:prstGeom>
+          <a:ln w="19050">
+            <a:solidFill>
+              <a:srgbClr val="7030A0"/>
+            </a:solidFill>
+            <a:tailEnd type="arrow"/>
+          </a:ln>
+        </p:spPr>
+        <p:style>
+          <a:lnRef idx="1">
+            <a:schemeClr val="accent1"/>
+          </a:lnRef>
+          <a:fillRef idx="0">
+            <a:schemeClr val="accent1"/>
+          </a:fillRef>
+          <a:effectRef idx="0">
+            <a:schemeClr val="accent1"/>
+          </a:effectRef>
+          <a:fontRef idx="minor">
+            <a:schemeClr val="tx1"/>
+          </a:fontRef>
+        </p:style>
+      </p:cxnSp>
+      <p:cxnSp>
+        <p:nvCxnSpPr>
+          <p:cNvPr id="60" name="Straight Arrow Connector 59">
             <a:extLst>
               <a:ext uri="{FF2B5EF4-FFF2-40B4-BE49-F238E27FC236}">
-                <a16:creationId xmlns:a16="http://schemas.microsoft.com/office/drawing/2014/main" id="{E4E1C8CA-49DF-45D8-80A5-D5C8282EE927}"/>
+                <a16:creationId xmlns:a16="http://schemas.microsoft.com/office/drawing/2014/main" xmlns="" id="{7C9F21BC-13A9-471F-825A-2621FD36355F}"/>
               </a:ext>
             </a:extLst>
           </p:cNvPr>
@@ -5116,11 +5162,11 @@
           <p:nvPr/>
         </p:nvCxnSpPr>
         <p:spPr>
-          <a:xfrm>
-            <a:off x="13016374" y="2898342"/>
-            <a:ext cx="17996" cy="1467648"/>
-          </a:xfrm>
-          <a:prstGeom prst="line">
+          <a:xfrm flipV="1">
+            <a:off x="13159629" y="5305086"/>
+            <a:ext cx="1470216" cy="6325"/>
+          </a:xfrm>
+          <a:prstGeom prst="straightConnector1">
             <a:avLst/>
           </a:prstGeom>
           <a:ln w="19050">
@@ -5128,42 +5174,189 @@
               <a:srgbClr val="7030A0"/>
             </a:solidFill>
             <a:prstDash val="sysDash"/>
+            <a:headEnd type="arrow" w="med" len="med"/>
+            <a:tailEnd type="none" w="med" len="med"/>
+          </a:ln>
+        </p:spPr>
+        <p:style>
+          <a:lnRef idx="1">
+            <a:schemeClr val="accent1"/>
+          </a:lnRef>
+          <a:fillRef idx="0">
+            <a:schemeClr val="accent1"/>
+          </a:fillRef>
+          <a:effectRef idx="0">
+            <a:schemeClr val="accent1"/>
+          </a:effectRef>
+          <a:fontRef idx="minor">
+            <a:schemeClr val="tx1"/>
+          </a:fontRef>
+        </p:style>
+      </p:cxnSp>
+      <p:cxnSp>
+        <p:nvCxnSpPr>
+          <p:cNvPr id="63" name="Straight Arrow Connector 62">
+            <a:extLst>
+              <a:ext uri="{FF2B5EF4-FFF2-40B4-BE49-F238E27FC236}">
+                <a16:creationId xmlns:a16="http://schemas.microsoft.com/office/drawing/2014/main" xmlns="" id="{7C9F21BC-13A9-471F-825A-2621FD36355F}"/>
+              </a:ext>
+            </a:extLst>
+          </p:cNvPr>
+          <p:cNvCxnSpPr>
+            <a:cxnSpLocks/>
+          </p:cNvCxnSpPr>
+          <p:nvPr/>
+        </p:nvCxnSpPr>
+        <p:spPr>
+          <a:xfrm>
+            <a:off x="10294585" y="5360987"/>
+            <a:ext cx="2791639" cy="0"/>
+          </a:xfrm>
+          <a:prstGeom prst="straightConnector1">
+            <a:avLst/>
+          </a:prstGeom>
+          <a:ln w="19050">
+            <a:solidFill>
+              <a:srgbClr val="7030A0"/>
+            </a:solidFill>
+            <a:prstDash val="sysDash"/>
+            <a:headEnd type="arrow" w="med" len="med"/>
+            <a:tailEnd type="none" w="med" len="med"/>
+          </a:ln>
+        </p:spPr>
+        <p:style>
+          <a:lnRef idx="1">
+            <a:schemeClr val="accent1"/>
+          </a:lnRef>
+          <a:fillRef idx="0">
+            <a:schemeClr val="accent1"/>
+          </a:fillRef>
+          <a:effectRef idx="0">
+            <a:schemeClr val="accent1"/>
+          </a:effectRef>
+          <a:fontRef idx="minor">
+            <a:schemeClr val="tx1"/>
+          </a:fontRef>
+        </p:style>
+      </p:cxnSp>
+      <p:sp>
+        <p:nvSpPr>
+          <p:cNvPr id="47" name="Rectangle 46">
+            <a:extLst>
+              <a:ext uri="{FF2B5EF4-FFF2-40B4-BE49-F238E27FC236}">
+                <a16:creationId xmlns:a16="http://schemas.microsoft.com/office/drawing/2014/main" xmlns="" id="{95A285D9-C4C4-4CBF-A454-E8A6C3B934B1}"/>
+              </a:ext>
+            </a:extLst>
+          </p:cNvPr>
+          <p:cNvSpPr/>
+          <p:nvPr/>
+        </p:nvSpPr>
+        <p:spPr>
+          <a:xfrm>
+            <a:off x="8291597" y="2160587"/>
+            <a:ext cx="149515" cy="1500018"/>
+          </a:xfrm>
+          <a:prstGeom prst="rect">
+            <a:avLst/>
+          </a:prstGeom>
+          <a:solidFill>
+            <a:srgbClr val="0070C0"/>
+          </a:solidFill>
+          <a:ln>
+            <a:solidFill>
+              <a:srgbClr val="0070C0"/>
+            </a:solidFill>
           </a:ln>
           <a:effectLst/>
         </p:spPr>
         <p:style>
           <a:lnRef idx="1">
-            <a:schemeClr val="accent1"/>
+            <a:schemeClr val="accent3"/>
           </a:lnRef>
           <a:fillRef idx="2">
-            <a:schemeClr val="accent1"/>
+            <a:schemeClr val="accent3"/>
           </a:fillRef>
           <a:effectRef idx="1">
-            <a:schemeClr val="accent1"/>
+            <a:schemeClr val="accent3"/>
           </a:effectRef>
           <a:fontRef idx="minor">
             <a:schemeClr val="dk1"/>
           </a:fontRef>
         </p:style>
+        <p:txBody>
+          <a:bodyPr rtlCol="0" anchor="ctr"/>
+          <a:lstStyle/>
+          <a:p>
+            <a:pPr algn="ctr"/>
+            <a:endParaRPr lang="en-SG" sz="1400"/>
+          </a:p>
+        </p:txBody>
+      </p:sp>
+      <p:cxnSp>
+        <p:nvCxnSpPr>
+          <p:cNvPr id="51" name="Straight Arrow Connector 50">
+            <a:extLst>
+              <a:ext uri="{FF2B5EF4-FFF2-40B4-BE49-F238E27FC236}">
+                <a16:creationId xmlns:a16="http://schemas.microsoft.com/office/drawing/2014/main" xmlns="" id="{39A494C5-24CF-48AE-8A0C-40894D902288}"/>
+              </a:ext>
+            </a:extLst>
+          </p:cNvPr>
+          <p:cNvCxnSpPr>
+            <a:cxnSpLocks/>
+          </p:cNvCxnSpPr>
+          <p:nvPr/>
+        </p:nvCxnSpPr>
+        <p:spPr>
+          <a:xfrm>
+            <a:off x="6654840" y="2171481"/>
+            <a:ext cx="1653140" cy="1"/>
+          </a:xfrm>
+          <a:prstGeom prst="straightConnector1">
+            <a:avLst/>
+          </a:prstGeom>
+          <a:ln w="19050">
+            <a:solidFill>
+              <a:srgbClr val="0070C0"/>
+            </a:solidFill>
+            <a:tailEnd type="arrow"/>
+          </a:ln>
+        </p:spPr>
+        <p:style>
+          <a:lnRef idx="1">
+            <a:schemeClr val="accent1"/>
+          </a:lnRef>
+          <a:fillRef idx="0">
+            <a:schemeClr val="accent1"/>
+          </a:fillRef>
+          <a:effectRef idx="0">
+            <a:schemeClr val="accent1"/>
+          </a:effectRef>
+          <a:fontRef idx="minor">
+            <a:schemeClr val="tx1"/>
+          </a:fontRef>
+        </p:style>
       </p:cxnSp>
       <p:sp>
         <p:nvSpPr>
-          <p:cNvPr id="41" name="TextBox 40"/>
+          <p:cNvPr id="53" name="TextBox 52">
+            <a:extLst>
+              <a:ext uri="{FF2B5EF4-FFF2-40B4-BE49-F238E27FC236}">
+                <a16:creationId xmlns:a16="http://schemas.microsoft.com/office/drawing/2014/main" xmlns="" id="{BBBBF940-F5BB-462D-9488-8F4D704067A3}"/>
+              </a:ext>
+            </a:extLst>
+          </p:cNvPr>
           <p:cNvSpPr txBox="1"/>
           <p:nvPr/>
         </p:nvSpPr>
         <p:spPr>
           <a:xfrm>
-            <a:off x="12096027" y="3002331"/>
-            <a:ext cx="551687" cy="184666"/>
+            <a:off x="6011501" y="2191257"/>
+            <a:ext cx="2139871" cy="215444"/>
           </a:xfrm>
           <a:prstGeom prst="rect">
             <a:avLst/>
           </a:prstGeom>
           <a:noFill/>
-          <a:ln>
-            <a:noFill/>
-          </a:ln>
         </p:spPr>
         <p:txBody>
           <a:bodyPr wrap="square" lIns="0" tIns="0" rIns="0" bIns="0" rtlCol="0">
@@ -5183,250 +5376,92 @@
           </a:lstStyle>
           <a:p>
             <a:r>
-              <a:rPr lang="en-US" sz="1200" dirty="0">
-                <a:solidFill>
-                  <a:srgbClr val="7030A0"/>
-                </a:solidFill>
-              </a:rPr>
-              <a:t>undo</a:t>
-            </a:r>
-            <a:r>
-              <a:rPr lang="en-US" sz="1200" dirty="0">
-                <a:solidFill>
-                  <a:schemeClr val="accent4">
-                    <a:lumMod val="75000"/>
-                  </a:schemeClr>
-                </a:solidFill>
-              </a:rPr>
-              <a:t>()</a:t>
-            </a:r>
-          </a:p>
-        </p:txBody>
-      </p:sp>
-      <p:cxnSp>
-        <p:nvCxnSpPr>
-          <p:cNvPr id="13" name="Curved Connector 12"/>
-          <p:cNvCxnSpPr/>
-          <p:nvPr/>
-        </p:nvCxnSpPr>
-        <p:spPr>
-          <a:xfrm rot="16200000" flipH="1">
-            <a:off x="12955914" y="3247566"/>
-            <a:ext cx="156923" cy="76200"/>
-          </a:xfrm>
-          <a:prstGeom prst="curvedConnector4">
-            <a:avLst>
-              <a:gd name="adj1" fmla="val -145677"/>
-              <a:gd name="adj2" fmla="val 400000"/>
-            </a:avLst>
-          </a:prstGeom>
-          <a:ln>
-            <a:solidFill>
-              <a:srgbClr val="7030A0"/>
-            </a:solidFill>
-            <a:tailEnd type="triangle"/>
-          </a:ln>
-        </p:spPr>
-        <p:style>
-          <a:lnRef idx="1">
-            <a:schemeClr val="accent1"/>
-          </a:lnRef>
-          <a:fillRef idx="0">
-            <a:schemeClr val="accent1"/>
-          </a:fillRef>
-          <a:effectRef idx="0">
-            <a:schemeClr val="accent1"/>
-          </a:effectRef>
-          <a:fontRef idx="minor">
-            <a:schemeClr val="tx1"/>
-          </a:fontRef>
-        </p:style>
-      </p:cxnSp>
-      <p:cxnSp>
-        <p:nvCxnSpPr>
-          <p:cNvPr id="52" name="Straight Arrow Connector 51"/>
-          <p:cNvCxnSpPr>
-            <a:cxnSpLocks/>
-          </p:cNvCxnSpPr>
-          <p:nvPr/>
-        </p:nvCxnSpPr>
-        <p:spPr>
-          <a:xfrm>
-            <a:off x="11472322" y="3209826"/>
-            <a:ext cx="1470216" cy="0"/>
-          </a:xfrm>
-          <a:prstGeom prst="straightConnector1">
-            <a:avLst/>
-          </a:prstGeom>
-          <a:ln w="19050">
-            <a:solidFill>
-              <a:srgbClr val="7030A0"/>
-            </a:solidFill>
-            <a:tailEnd type="arrow"/>
-          </a:ln>
-        </p:spPr>
-        <p:style>
-          <a:lnRef idx="1">
-            <a:schemeClr val="accent1"/>
-          </a:lnRef>
-          <a:fillRef idx="0">
-            <a:schemeClr val="accent1"/>
-          </a:fillRef>
-          <a:effectRef idx="0">
-            <a:schemeClr val="accent1"/>
-          </a:effectRef>
-          <a:fontRef idx="minor">
-            <a:schemeClr val="tx1"/>
-          </a:fontRef>
-        </p:style>
-      </p:cxnSp>
-      <p:cxnSp>
-        <p:nvCxnSpPr>
-          <p:cNvPr id="60" name="Straight Arrow Connector 59">
+              <a:rPr lang="en-US" dirty="0"/>
+              <a:t>parse(arguments)</a:t>
+            </a:r>
+          </a:p>
+        </p:txBody>
+      </p:sp>
+      <p:sp>
+        <p:nvSpPr>
+          <p:cNvPr id="54" name="Rectangle 53">
             <a:extLst>
               <a:ext uri="{FF2B5EF4-FFF2-40B4-BE49-F238E27FC236}">
-                <a16:creationId xmlns:a16="http://schemas.microsoft.com/office/drawing/2014/main" id="{7C9F21BC-13A9-471F-825A-2621FD36355F}"/>
+                <a16:creationId xmlns:a16="http://schemas.microsoft.com/office/drawing/2014/main" xmlns="" id="{D2BE09C2-5C87-4305-9822-9531B997427C}"/>
               </a:ext>
             </a:extLst>
           </p:cNvPr>
-          <p:cNvCxnSpPr>
-            <a:cxnSpLocks/>
-          </p:cNvCxnSpPr>
+          <p:cNvSpPr/>
           <p:nvPr/>
-        </p:nvCxnSpPr>
-        <p:spPr>
-          <a:xfrm flipV="1">
-            <a:off x="11472322" y="3591906"/>
-            <a:ext cx="1470216" cy="6325"/>
-          </a:xfrm>
-          <a:prstGeom prst="straightConnector1">
+        </p:nvSpPr>
+        <p:spPr>
+          <a:xfrm>
+            <a:off x="10124544" y="2373477"/>
+            <a:ext cx="152400" cy="276003"/>
+          </a:xfrm>
+          <a:prstGeom prst="rect">
             <a:avLst/>
           </a:prstGeom>
-          <a:ln w="19050">
+          <a:solidFill>
+            <a:srgbClr val="0070C0"/>
+          </a:solidFill>
+          <a:ln>
             <a:solidFill>
-              <a:srgbClr val="7030A0"/>
+              <a:srgbClr val="0070C0"/>
             </a:solidFill>
-            <a:prstDash val="sysDash"/>
-            <a:headEnd type="arrow" w="med" len="med"/>
-            <a:tailEnd type="none" w="med" len="med"/>
           </a:ln>
+          <a:effectLst/>
         </p:spPr>
         <p:style>
           <a:lnRef idx="1">
-            <a:schemeClr val="accent1"/>
+            <a:schemeClr val="accent3"/>
           </a:lnRef>
-          <a:fillRef idx="0">
-            <a:schemeClr val="accent1"/>
+          <a:fillRef idx="2">
+            <a:schemeClr val="accent3"/>
           </a:fillRef>
-          <a:effectRef idx="0">
-            <a:schemeClr val="accent1"/>
+          <a:effectRef idx="1">
+            <a:schemeClr val="accent3"/>
           </a:effectRef>
           <a:fontRef idx="minor">
-            <a:schemeClr val="tx1"/>
+            <a:schemeClr val="dk1"/>
           </a:fontRef>
         </p:style>
-      </p:cxnSp>
-      <p:cxnSp>
-        <p:nvCxnSpPr>
-          <p:cNvPr id="63" name="Straight Arrow Connector 62">
+        <p:txBody>
+          <a:bodyPr rtlCol="0" anchor="ctr"/>
+          <a:lstStyle/>
+          <a:p>
+            <a:pPr algn="ctr"/>
+            <a:endParaRPr lang="en-SG" sz="1400"/>
+          </a:p>
+        </p:txBody>
+      </p:sp>
+      <p:sp>
+        <p:nvSpPr>
+          <p:cNvPr id="55" name="Rectangle 62">
             <a:extLst>
               <a:ext uri="{FF2B5EF4-FFF2-40B4-BE49-F238E27FC236}">
-                <a16:creationId xmlns:a16="http://schemas.microsoft.com/office/drawing/2014/main" id="{7C9F21BC-13A9-471F-825A-2621FD36355F}"/>
+                <a16:creationId xmlns:a16="http://schemas.microsoft.com/office/drawing/2014/main" xmlns="" id="{0F396278-EF7A-4EDC-8AD1-8EE5D0DA22AC}"/>
               </a:ext>
             </a:extLst>
           </p:cNvPr>
-          <p:cNvCxnSpPr>
-            <a:cxnSpLocks/>
-            <a:endCxn id="49" idx="2"/>
-          </p:cNvCxnSpPr>
+          <p:cNvSpPr/>
           <p:nvPr/>
-        </p:nvCxnSpPr>
-        <p:spPr>
-          <a:xfrm>
-            <a:off x="10104250" y="3760786"/>
-            <a:ext cx="1296056" cy="0"/>
-          </a:xfrm>
-          <a:prstGeom prst="straightConnector1">
+        </p:nvSpPr>
+        <p:spPr>
+          <a:xfrm>
+            <a:off x="9540906" y="2032250"/>
+            <a:ext cx="1330346" cy="385338"/>
+          </a:xfrm>
+          <a:prstGeom prst="rect">
             <a:avLst/>
           </a:prstGeom>
+          <a:solidFill>
+            <a:srgbClr val="0070C0"/>
+          </a:solidFill>
           <a:ln w="19050">
             <a:solidFill>
-              <a:srgbClr val="7030A0"/>
+              <a:srgbClr val="0070C0"/>
             </a:solidFill>
-            <a:prstDash val="sysDash"/>
-            <a:headEnd type="arrow" w="med" len="med"/>
-            <a:tailEnd type="none" w="med" len="med"/>
-          </a:ln>
-        </p:spPr>
-        <p:style>
-          <a:lnRef idx="1">
-            <a:schemeClr val="accent1"/>
-          </a:lnRef>
-          <a:fillRef idx="0">
-            <a:schemeClr val="accent1"/>
-          </a:fillRef>
-          <a:effectRef idx="0">
-            <a:schemeClr val="accent1"/>
-          </a:effectRef>
-          <a:fontRef idx="minor">
-            <a:schemeClr val="tx1"/>
-          </a:fontRef>
-        </p:style>
-      </p:cxnSp>
-    </p:spTree>
-    <p:extLst>
-      <p:ext uri="{BB962C8B-B14F-4D97-AF65-F5344CB8AC3E}">
-        <p14:creationId xmlns:p14="http://schemas.microsoft.com/office/powerpoint/2010/main" val="3945898909"/>
-      </p:ext>
-    </p:extLst>
-  </p:cSld>
-  <p:clrMapOvr>
-    <a:masterClrMapping/>
-  </p:clrMapOvr>
-</p:sld>
-</file>
-
-<file path=ppt/slides/slide2.xml><?xml version="1.0" encoding="utf-8"?>
-<p:sld xmlns:a="http://schemas.openxmlformats.org/drawingml/2006/main" xmlns:r="http://schemas.openxmlformats.org/officeDocument/2006/relationships" xmlns:p="http://schemas.openxmlformats.org/presentationml/2006/main">
-  <p:cSld>
-    <p:spTree>
-      <p:nvGrpSpPr>
-        <p:cNvPr id="1" name=""/>
-        <p:cNvGrpSpPr/>
-        <p:nvPr/>
-      </p:nvGrpSpPr>
-      <p:grpSpPr>
-        <a:xfrm>
-          <a:off x="0" y="0"/>
-          <a:ext cx="0" cy="0"/>
-          <a:chOff x="0" y="0"/>
-          <a:chExt cx="0" cy="0"/>
-        </a:xfrm>
-      </p:grpSpPr>
-      <p:sp>
-        <p:nvSpPr>
-          <p:cNvPr id="56" name="Rectangle 65"/>
-          <p:cNvSpPr/>
-          <p:nvPr/>
-        </p:nvSpPr>
-        <p:spPr>
-          <a:xfrm>
-            <a:off x="12575015" y="136738"/>
-            <a:ext cx="3903825" cy="5665354"/>
-          </a:xfrm>
-          <a:prstGeom prst="roundRect">
-            <a:avLst>
-              <a:gd name="adj" fmla="val 3484"/>
-            </a:avLst>
-          </a:prstGeom>
-          <a:solidFill>
-            <a:schemeClr val="accent4">
-              <a:lumMod val="20000"/>
-              <a:lumOff val="80000"/>
-            </a:schemeClr>
-          </a:solidFill>
-          <a:ln w="19050">
-            <a:noFill/>
           </a:ln>
           <a:effectLst/>
         </p:spPr>
@@ -5445,49 +5480,197 @@
           </a:fontRef>
         </p:style>
         <p:txBody>
-          <a:bodyPr rtlCol="0" anchor="t"/>
+          <a:bodyPr rtlCol="0" anchor="ctr"/>
           <a:lstStyle/>
           <a:p>
-            <a:r>
-              <a:rPr lang="en-US" sz="1200" b="1" dirty="0">
+            <a:pPr algn="ctr"/>
+            <a:r>
+              <a:rPr lang="en-US" sz="1600" dirty="0">
                 <a:solidFill>
-                  <a:srgbClr val="7030A0"/>
+                  <a:schemeClr val="bg1"/>
                 </a:solidFill>
               </a:rPr>
-              <a:t>Model</a:t>
-            </a:r>
-            <a:endParaRPr lang="en-SG" sz="1200" b="1" dirty="0">
+              <a:t>g:Goal</a:t>
+            </a:r>
+            <a:endParaRPr lang="en-SG" sz="1600" dirty="0">
               <a:solidFill>
-                <a:srgbClr val="7030A0"/>
+                <a:schemeClr val="bg1"/>
               </a:solidFill>
             </a:endParaRPr>
           </a:p>
         </p:txBody>
       </p:sp>
-      <p:sp>
-        <p:nvSpPr>
-          <p:cNvPr id="81" name="Rectangle 65"/>
+      <p:cxnSp>
+        <p:nvCxnSpPr>
+          <p:cNvPr id="57" name="Straight Arrow Connector 56">
+            <a:extLst>
+              <a:ext uri="{FF2B5EF4-FFF2-40B4-BE49-F238E27FC236}">
+                <a16:creationId xmlns:a16="http://schemas.microsoft.com/office/drawing/2014/main" xmlns="" id="{DFAC7711-44EE-40C4-84B5-C679845F3B6A}"/>
+              </a:ext>
+            </a:extLst>
+          </p:cNvPr>
+          <p:cNvCxnSpPr>
+            <a:cxnSpLocks/>
+            <a:endCxn id="55" idx="1"/>
+          </p:cNvCxnSpPr>
+          <p:nvPr/>
+        </p:nvCxnSpPr>
+        <p:spPr>
+          <a:xfrm flipV="1">
+            <a:off x="8441112" y="2224919"/>
+            <a:ext cx="1099799" cy="11142"/>
+          </a:xfrm>
+          <a:prstGeom prst="straightConnector1">
+            <a:avLst/>
+          </a:prstGeom>
+          <a:ln w="19050">
+            <a:solidFill>
+              <a:srgbClr val="0070C0"/>
+            </a:solidFill>
+            <a:tailEnd type="arrow"/>
+          </a:ln>
+        </p:spPr>
+        <p:style>
+          <a:lnRef idx="1">
+            <a:schemeClr val="accent1"/>
+          </a:lnRef>
+          <a:fillRef idx="0">
+            <a:schemeClr val="accent1"/>
+          </a:fillRef>
+          <a:effectRef idx="0">
+            <a:schemeClr val="accent1"/>
+          </a:effectRef>
+          <a:fontRef idx="minor">
+            <a:schemeClr val="tx1"/>
+          </a:fontRef>
+        </p:style>
+      </p:cxnSp>
+      <p:cxnSp>
+        <p:nvCxnSpPr>
+          <p:cNvPr id="58" name="Straight Arrow Connector 57">
+            <a:extLst>
+              <a:ext uri="{FF2B5EF4-FFF2-40B4-BE49-F238E27FC236}">
+                <a16:creationId xmlns:a16="http://schemas.microsoft.com/office/drawing/2014/main" xmlns="" id="{6FE3667C-5D7B-40FC-A811-9C500B20AB16}"/>
+              </a:ext>
+            </a:extLst>
+          </p:cNvPr>
+          <p:cNvCxnSpPr>
+            <a:cxnSpLocks/>
+          </p:cNvCxnSpPr>
+          <p:nvPr/>
+        </p:nvCxnSpPr>
+        <p:spPr>
+          <a:xfrm flipV="1">
+            <a:off x="8462183" y="2644903"/>
+            <a:ext cx="1732479" cy="3210"/>
+          </a:xfrm>
+          <a:prstGeom prst="straightConnector1">
+            <a:avLst/>
+          </a:prstGeom>
+          <a:ln w="19050">
+            <a:solidFill>
+              <a:srgbClr val="0070C0"/>
+            </a:solidFill>
+            <a:prstDash val="sysDash"/>
+            <a:headEnd type="arrow" w="med" len="med"/>
+            <a:tailEnd type="none" w="med" len="med"/>
+          </a:ln>
+        </p:spPr>
+        <p:style>
+          <a:lnRef idx="1">
+            <a:schemeClr val="accent1"/>
+          </a:lnRef>
+          <a:fillRef idx="0">
+            <a:schemeClr val="accent1"/>
+          </a:fillRef>
+          <a:effectRef idx="0">
+            <a:schemeClr val="accent1"/>
+          </a:effectRef>
+          <a:fontRef idx="minor">
+            <a:schemeClr val="tx1"/>
+          </a:fontRef>
+        </p:style>
+      </p:cxnSp>
+      <p:sp>
+        <p:nvSpPr>
+          <p:cNvPr id="59" name="Rectangle 58">
+            <a:extLst>
+              <a:ext uri="{FF2B5EF4-FFF2-40B4-BE49-F238E27FC236}">
+                <a16:creationId xmlns:a16="http://schemas.microsoft.com/office/drawing/2014/main" xmlns="" id="{89A4C19F-4221-4C46-B252-532A32FDF6DB}"/>
+              </a:ext>
+            </a:extLst>
+          </p:cNvPr>
           <p:cNvSpPr/>
           <p:nvPr/>
         </p:nvSpPr>
         <p:spPr>
           <a:xfrm>
-            <a:off x="2980531" y="136743"/>
-            <a:ext cx="9524948" cy="6519621"/>
-          </a:xfrm>
-          <a:prstGeom prst="roundRect">
-            <a:avLst>
-              <a:gd name="adj" fmla="val 3484"/>
-            </a:avLst>
+            <a:off x="10121840" y="3260016"/>
+            <a:ext cx="152400" cy="276003"/>
+          </a:xfrm>
+          <a:prstGeom prst="rect">
+            <a:avLst/>
           </a:prstGeom>
           <a:solidFill>
-            <a:schemeClr val="accent1">
-              <a:lumMod val="20000"/>
-              <a:lumOff val="80000"/>
-            </a:schemeClr>
+            <a:srgbClr val="0070C0"/>
+          </a:solidFill>
+          <a:ln>
+            <a:solidFill>
+              <a:srgbClr val="0070C0"/>
+            </a:solidFill>
+          </a:ln>
+          <a:effectLst/>
+        </p:spPr>
+        <p:style>
+          <a:lnRef idx="1">
+            <a:schemeClr val="accent3"/>
+          </a:lnRef>
+          <a:fillRef idx="2">
+            <a:schemeClr val="accent3"/>
+          </a:fillRef>
+          <a:effectRef idx="1">
+            <a:schemeClr val="accent3"/>
+          </a:effectRef>
+          <a:fontRef idx="minor">
+            <a:schemeClr val="dk1"/>
+          </a:fontRef>
+        </p:style>
+        <p:txBody>
+          <a:bodyPr rtlCol="0" anchor="ctr"/>
+          <a:lstStyle/>
+          <a:p>
+            <a:pPr algn="ctr"/>
+            <a:endParaRPr lang="en-SG" sz="1400"/>
+          </a:p>
+        </p:txBody>
+      </p:sp>
+      <p:sp>
+        <p:nvSpPr>
+          <p:cNvPr id="61" name="Rectangle 62">
+            <a:extLst>
+              <a:ext uri="{FF2B5EF4-FFF2-40B4-BE49-F238E27FC236}">
+                <a16:creationId xmlns:a16="http://schemas.microsoft.com/office/drawing/2014/main" xmlns="" id="{5EA1181C-5AE5-44DA-AF4F-EEE8B279B312}"/>
+              </a:ext>
+            </a:extLst>
+          </p:cNvPr>
+          <p:cNvSpPr/>
+          <p:nvPr/>
+        </p:nvSpPr>
+        <p:spPr>
+          <a:xfrm>
+            <a:off x="9270317" y="2879330"/>
+            <a:ext cx="1848689" cy="461538"/>
+          </a:xfrm>
+          <a:prstGeom prst="rect">
+            <a:avLst/>
+          </a:prstGeom>
+          <a:solidFill>
+            <a:srgbClr val="0070C0"/>
           </a:solidFill>
           <a:ln w="19050">
-            <a:noFill/>
+            <a:solidFill>
+              <a:srgbClr val="0070C0"/>
+            </a:solidFill>
           </a:ln>
           <a:effectLst/>
         </p:spPr>
@@ -5506,64 +5689,6 @@
           </a:fontRef>
         </p:style>
         <p:txBody>
-          <a:bodyPr rtlCol="0" anchor="t"/>
-          <a:lstStyle/>
-          <a:p>
-            <a:r>
-              <a:rPr lang="en-US" sz="1200" b="1" dirty="0">
-                <a:solidFill>
-                  <a:srgbClr val="0070C0"/>
-                </a:solidFill>
-              </a:rPr>
-              <a:t>Logic</a:t>
-            </a:r>
-            <a:endParaRPr lang="en-SG" sz="1200" b="1" dirty="0">
-              <a:solidFill>
-                <a:srgbClr val="0070C0"/>
-              </a:solidFill>
-            </a:endParaRPr>
-          </a:p>
-        </p:txBody>
-      </p:sp>
-      <p:sp>
-        <p:nvSpPr>
-          <p:cNvPr id="2" name="Rectangle 62"/>
-          <p:cNvSpPr/>
-          <p:nvPr/>
-        </p:nvSpPr>
-        <p:spPr>
-          <a:xfrm>
-            <a:off x="3395868" y="570933"/>
-            <a:ext cx="1455629" cy="346760"/>
-          </a:xfrm>
-          <a:prstGeom prst="rect">
-            <a:avLst/>
-          </a:prstGeom>
-          <a:solidFill>
-            <a:srgbClr val="0070C0"/>
-          </a:solidFill>
-          <a:ln w="19050">
-            <a:solidFill>
-              <a:srgbClr val="0070C0"/>
-            </a:solidFill>
-          </a:ln>
-          <a:effectLst/>
-        </p:spPr>
-        <p:style>
-          <a:lnRef idx="1">
-            <a:schemeClr val="accent2"/>
-          </a:lnRef>
-          <a:fillRef idx="2">
-            <a:schemeClr val="accent2"/>
-          </a:fillRef>
-          <a:effectRef idx="1">
-            <a:schemeClr val="accent2"/>
-          </a:effectRef>
-          <a:fontRef idx="minor">
-            <a:schemeClr val="dk1"/>
-          </a:fontRef>
-        </p:style>
-        <p:txBody>
           <a:bodyPr rtlCol="0" anchor="ctr"/>
           <a:lstStyle/>
           <a:p>
@@ -5574,15 +5699,7 @@
                   <a:schemeClr val="bg1"/>
                 </a:solidFill>
               </a:rPr>
-              <a:t>:</a:t>
-            </a:r>
-            <a:r>
-              <a:rPr lang="en-US" sz="1600" dirty="0" err="1">
-                <a:solidFill>
-                  <a:schemeClr val="bg1"/>
-                </a:solidFill>
-              </a:rPr>
-              <a:t>LogicManager</a:t>
+              <a:t>s:SetGoalCommand</a:t>
             </a:r>
             <a:endParaRPr lang="en-SG" sz="1600" dirty="0">
               <a:solidFill>
@@ -5594,426 +5711,22 @@
       </p:sp>
       <p:cxnSp>
         <p:nvCxnSpPr>
-          <p:cNvPr id="5" name="Straight Connector 4"/>
+          <p:cNvPr id="62" name="Straight Arrow Connector 61">
+            <a:extLst>
+              <a:ext uri="{FF2B5EF4-FFF2-40B4-BE49-F238E27FC236}">
+                <a16:creationId xmlns:a16="http://schemas.microsoft.com/office/drawing/2014/main" xmlns="" id="{B21B13F1-4DC6-4F72-A101-88C694534280}"/>
+              </a:ext>
+            </a:extLst>
+          </p:cNvPr>
           <p:cNvCxnSpPr>
             <a:cxnSpLocks/>
           </p:cNvCxnSpPr>
           <p:nvPr/>
         </p:nvCxnSpPr>
         <p:spPr>
-          <a:xfrm>
-            <a:off x="4123677" y="934609"/>
-            <a:ext cx="0" cy="3481399"/>
-          </a:xfrm>
-          <a:prstGeom prst="line">
-            <a:avLst/>
-          </a:prstGeom>
-          <a:ln w="19050">
-            <a:solidFill>
-              <a:srgbClr val="0070C0"/>
-            </a:solidFill>
-            <a:prstDash val="sysDash"/>
-          </a:ln>
-          <a:effectLst/>
-        </p:spPr>
-        <p:style>
-          <a:lnRef idx="1">
-            <a:schemeClr val="accent1"/>
-          </a:lnRef>
-          <a:fillRef idx="2">
-            <a:schemeClr val="accent1"/>
-          </a:fillRef>
-          <a:effectRef idx="1">
-            <a:schemeClr val="accent1"/>
-          </a:effectRef>
-          <a:fontRef idx="minor">
-            <a:schemeClr val="dk1"/>
-          </a:fontRef>
-        </p:style>
-      </p:cxnSp>
-      <p:sp>
-        <p:nvSpPr>
-          <p:cNvPr id="6" name="Rectangle 5"/>
-          <p:cNvSpPr/>
-          <p:nvPr/>
-        </p:nvSpPr>
-        <p:spPr>
-          <a:xfrm>
-            <a:off x="4051674" y="1285302"/>
-            <a:ext cx="172591" cy="5073953"/>
-          </a:xfrm>
-          <a:prstGeom prst="rect">
-            <a:avLst/>
-          </a:prstGeom>
-          <a:solidFill>
-            <a:srgbClr val="0070C0"/>
-          </a:solidFill>
-          <a:ln>
-            <a:solidFill>
-              <a:srgbClr val="0070C0"/>
-            </a:solidFill>
-          </a:ln>
-          <a:effectLst/>
-        </p:spPr>
-        <p:style>
-          <a:lnRef idx="1">
-            <a:schemeClr val="accent3"/>
-          </a:lnRef>
-          <a:fillRef idx="2">
-            <a:schemeClr val="accent3"/>
-          </a:fillRef>
-          <a:effectRef idx="1">
-            <a:schemeClr val="accent3"/>
-          </a:effectRef>
-          <a:fontRef idx="minor">
-            <a:schemeClr val="dk1"/>
-          </a:fontRef>
-        </p:style>
-        <p:txBody>
-          <a:bodyPr rtlCol="0" anchor="ctr"/>
-          <a:lstStyle/>
-          <a:p>
-            <a:pPr algn="ctr"/>
-            <a:endParaRPr lang="en-SG" sz="1400"/>
-          </a:p>
-        </p:txBody>
-      </p:sp>
-      <p:sp>
-        <p:nvSpPr>
-          <p:cNvPr id="16" name="Rectangle 62"/>
-          <p:cNvSpPr/>
-          <p:nvPr/>
-        </p:nvSpPr>
-        <p:spPr>
-          <a:xfrm>
-            <a:off x="5865525" y="450009"/>
-            <a:ext cx="1387962" cy="467684"/>
-          </a:xfrm>
-          <a:prstGeom prst="rect">
-            <a:avLst/>
-          </a:prstGeom>
-          <a:solidFill>
-            <a:srgbClr val="0070C0"/>
-          </a:solidFill>
-          <a:ln w="19050">
-            <a:solidFill>
-              <a:srgbClr val="0070C0"/>
-            </a:solidFill>
-          </a:ln>
-          <a:effectLst/>
-        </p:spPr>
-        <p:style>
-          <a:lnRef idx="1">
-            <a:schemeClr val="accent2"/>
-          </a:lnRef>
-          <a:fillRef idx="2">
-            <a:schemeClr val="accent2"/>
-          </a:fillRef>
-          <a:effectRef idx="1">
-            <a:schemeClr val="accent2"/>
-          </a:effectRef>
-          <a:fontRef idx="minor">
-            <a:schemeClr val="dk1"/>
-          </a:fontRef>
-        </p:style>
-        <p:txBody>
-          <a:bodyPr rtlCol="0" anchor="ctr"/>
-          <a:lstStyle/>
-          <a:p>
-            <a:pPr algn="ctr"/>
-            <a:r>
-              <a:rPr lang="en-US" sz="1600" dirty="0">
-                <a:solidFill>
-                  <a:schemeClr val="bg1"/>
-                </a:solidFill>
-              </a:rPr>
-              <a:t>:</a:t>
-            </a:r>
-            <a:r>
-              <a:rPr lang="en-US" sz="1600" dirty="0" err="1">
-                <a:solidFill>
-                  <a:schemeClr val="bg1"/>
-                </a:solidFill>
-              </a:rPr>
-              <a:t>EPiggyParser</a:t>
-            </a:r>
-            <a:endParaRPr lang="en-SG" sz="1600" dirty="0">
-              <a:solidFill>
-                <a:schemeClr val="bg1"/>
-              </a:solidFill>
-            </a:endParaRPr>
-          </a:p>
-        </p:txBody>
-      </p:sp>
-      <p:cxnSp>
-        <p:nvCxnSpPr>
-          <p:cNvPr id="17" name="Straight Connector 16"/>
-          <p:cNvCxnSpPr>
-            <a:cxnSpLocks/>
-          </p:cNvCxnSpPr>
-          <p:nvPr/>
-        </p:nvCxnSpPr>
-        <p:spPr>
-          <a:xfrm>
-            <a:off x="6563305" y="934604"/>
-            <a:ext cx="0" cy="1482984"/>
-          </a:xfrm>
-          <a:prstGeom prst="line">
-            <a:avLst/>
-          </a:prstGeom>
-          <a:ln w="19050">
-            <a:solidFill>
-              <a:srgbClr val="0070C0"/>
-            </a:solidFill>
-            <a:prstDash val="sysDash"/>
-          </a:ln>
-          <a:effectLst/>
-        </p:spPr>
-        <p:style>
-          <a:lnRef idx="1">
-            <a:schemeClr val="accent1"/>
-          </a:lnRef>
-          <a:fillRef idx="2">
-            <a:schemeClr val="accent1"/>
-          </a:fillRef>
-          <a:effectRef idx="1">
-            <a:schemeClr val="accent1"/>
-          </a:effectRef>
-          <a:fontRef idx="minor">
-            <a:schemeClr val="dk1"/>
-          </a:fontRef>
-        </p:style>
-      </p:cxnSp>
-      <p:sp>
-        <p:nvSpPr>
-          <p:cNvPr id="18" name="Rectangle 17"/>
-          <p:cNvSpPr/>
-          <p:nvPr/>
-        </p:nvSpPr>
-        <p:spPr>
-          <a:xfrm>
-            <a:off x="6491298" y="1392800"/>
-            <a:ext cx="157380" cy="2367985"/>
-          </a:xfrm>
-          <a:prstGeom prst="rect">
-            <a:avLst/>
-          </a:prstGeom>
-          <a:solidFill>
-            <a:srgbClr val="0070C0"/>
-          </a:solidFill>
-          <a:ln>
-            <a:solidFill>
-              <a:srgbClr val="0070C0"/>
-            </a:solidFill>
-          </a:ln>
-          <a:effectLst/>
-        </p:spPr>
-        <p:style>
-          <a:lnRef idx="1">
-            <a:schemeClr val="accent3"/>
-          </a:lnRef>
-          <a:fillRef idx="2">
-            <a:schemeClr val="accent3"/>
-          </a:fillRef>
-          <a:effectRef idx="1">
-            <a:schemeClr val="accent3"/>
-          </a:effectRef>
-          <a:fontRef idx="minor">
-            <a:schemeClr val="dk1"/>
-          </a:fontRef>
-        </p:style>
-        <p:txBody>
-          <a:bodyPr rtlCol="0" anchor="ctr"/>
-          <a:lstStyle/>
-          <a:p>
-            <a:pPr algn="ctr"/>
-            <a:endParaRPr lang="en-SG" sz="1400"/>
-          </a:p>
-        </p:txBody>
-      </p:sp>
-      <p:cxnSp>
-        <p:nvCxnSpPr>
-          <p:cNvPr id="20" name="Straight Connector 19"/>
-          <p:cNvCxnSpPr>
-            <a:cxnSpLocks/>
-            <a:stCxn id="21" idx="0"/>
-          </p:cNvCxnSpPr>
-          <p:nvPr/>
-        </p:nvCxnSpPr>
-        <p:spPr>
-          <a:xfrm>
-            <a:off x="8367792" y="1662174"/>
-            <a:ext cx="3784" cy="2159273"/>
-          </a:xfrm>
-          <a:prstGeom prst="line">
-            <a:avLst/>
-          </a:prstGeom>
-          <a:ln w="19050">
-            <a:solidFill>
-              <a:srgbClr val="0070C0"/>
-            </a:solidFill>
-            <a:prstDash val="sysDash"/>
-          </a:ln>
-          <a:effectLst/>
-        </p:spPr>
-        <p:style>
-          <a:lnRef idx="1">
-            <a:schemeClr val="accent1"/>
-          </a:lnRef>
-          <a:fillRef idx="2">
-            <a:schemeClr val="accent1"/>
-          </a:fillRef>
-          <a:effectRef idx="1">
-            <a:schemeClr val="accent1"/>
-          </a:effectRef>
-          <a:fontRef idx="minor">
-            <a:schemeClr val="dk1"/>
-          </a:fontRef>
-        </p:style>
-      </p:cxnSp>
-      <p:sp>
-        <p:nvSpPr>
-          <p:cNvPr id="21" name="Rectangle 20"/>
-          <p:cNvSpPr/>
-          <p:nvPr/>
-        </p:nvSpPr>
-        <p:spPr>
-          <a:xfrm>
-            <a:off x="8291592" y="1662174"/>
-            <a:ext cx="152400" cy="276003"/>
-          </a:xfrm>
-          <a:prstGeom prst="rect">
-            <a:avLst/>
-          </a:prstGeom>
-          <a:solidFill>
-            <a:srgbClr val="0070C0"/>
-          </a:solidFill>
-          <a:ln>
-            <a:solidFill>
-              <a:srgbClr val="0070C0"/>
-            </a:solidFill>
-          </a:ln>
-          <a:effectLst/>
-        </p:spPr>
-        <p:style>
-          <a:lnRef idx="1">
-            <a:schemeClr val="accent3"/>
-          </a:lnRef>
-          <a:fillRef idx="2">
-            <a:schemeClr val="accent3"/>
-          </a:fillRef>
-          <a:effectRef idx="1">
-            <a:schemeClr val="accent3"/>
-          </a:effectRef>
-          <a:fontRef idx="minor">
-            <a:schemeClr val="dk1"/>
-          </a:fontRef>
-        </p:style>
-        <p:txBody>
-          <a:bodyPr rtlCol="0" anchor="ctr"/>
-          <a:lstStyle/>
-          <a:p>
-            <a:pPr algn="ctr"/>
-            <a:endParaRPr lang="en-SG" sz="1400"/>
-          </a:p>
-        </p:txBody>
-      </p:sp>
-      <p:cxnSp>
-        <p:nvCxnSpPr>
-          <p:cNvPr id="23" name="Straight Arrow Connector 22"/>
-          <p:cNvCxnSpPr/>
-          <p:nvPr/>
-        </p:nvCxnSpPr>
-        <p:spPr>
-          <a:xfrm>
-            <a:off x="2931823" y="1288986"/>
-            <a:ext cx="1119851" cy="0"/>
-          </a:xfrm>
-          <a:prstGeom prst="straightConnector1">
-            <a:avLst/>
-          </a:prstGeom>
-          <a:ln w="19050">
-            <a:solidFill>
-              <a:srgbClr val="00B050"/>
-            </a:solidFill>
-            <a:tailEnd type="arrow"/>
-          </a:ln>
-        </p:spPr>
-        <p:style>
-          <a:lnRef idx="1">
-            <a:schemeClr val="accent1"/>
-          </a:lnRef>
-          <a:fillRef idx="0">
-            <a:schemeClr val="accent1"/>
-          </a:fillRef>
-          <a:effectRef idx="0">
-            <a:schemeClr val="accent1"/>
-          </a:effectRef>
-          <a:fontRef idx="minor">
-            <a:schemeClr val="tx1"/>
-          </a:fontRef>
-        </p:style>
-      </p:cxnSp>
-      <p:sp>
-        <p:nvSpPr>
-          <p:cNvPr id="26" name="TextBox 25"/>
-          <p:cNvSpPr txBox="1"/>
-          <p:nvPr/>
-        </p:nvSpPr>
-        <p:spPr>
-          <a:xfrm>
-            <a:off x="2284120" y="1017587"/>
-            <a:ext cx="1691544" cy="215444"/>
-          </a:xfrm>
-          <a:prstGeom prst="rect">
-            <a:avLst/>
-          </a:prstGeom>
-          <a:noFill/>
-        </p:spPr>
-        <p:txBody>
-          <a:bodyPr wrap="square" lIns="0" tIns="0" rIns="0" bIns="0" rtlCol="0">
-            <a:spAutoFit/>
-          </a:bodyPr>
-          <a:lstStyle/>
-          <a:p>
-            <a:pPr algn="r"/>
-            <a:r>
-              <a:rPr lang="en-US" sz="1400" dirty="0">
-                <a:solidFill>
-                  <a:srgbClr val="0070C0"/>
-                </a:solidFill>
-              </a:rPr>
-              <a:t>execute(“</a:t>
-            </a:r>
-            <a:r>
-              <a:rPr lang="en-US" sz="1400" dirty="0" err="1">
-                <a:solidFill>
-                  <a:srgbClr val="0070C0"/>
-                </a:solidFill>
-              </a:rPr>
-              <a:t>setGoal</a:t>
-            </a:r>
-            <a:r>
-              <a:rPr lang="en-US" sz="1400" dirty="0">
-                <a:solidFill>
-                  <a:srgbClr val="0070C0"/>
-                </a:solidFill>
-              </a:rPr>
-              <a:t> …”)</a:t>
-            </a:r>
-          </a:p>
-        </p:txBody>
-      </p:sp>
-      <p:cxnSp>
-        <p:nvCxnSpPr>
-          <p:cNvPr id="28" name="Straight Arrow Connector 27"/>
-          <p:cNvCxnSpPr/>
-          <p:nvPr/>
-        </p:nvCxnSpPr>
-        <p:spPr>
           <a:xfrm flipV="1">
-            <a:off x="6648690" y="1539332"/>
-            <a:ext cx="922392" cy="1"/>
+            <a:off x="8449152" y="3010977"/>
+            <a:ext cx="801055" cy="8115"/>
           </a:xfrm>
           <a:prstGeom prst="straightConnector1">
             <a:avLst/>
@@ -6040,16 +5753,114 @@
           </a:fontRef>
         </p:style>
       </p:cxnSp>
-      <p:sp>
-        <p:nvSpPr>
-          <p:cNvPr id="29" name="TextBox 28"/>
+      <p:cxnSp>
+        <p:nvCxnSpPr>
+          <p:cNvPr id="64" name="Straight Arrow Connector 63">
+            <a:extLst>
+              <a:ext uri="{FF2B5EF4-FFF2-40B4-BE49-F238E27FC236}">
+                <a16:creationId xmlns:a16="http://schemas.microsoft.com/office/drawing/2014/main" xmlns="" id="{BC96654F-40DD-44EB-893A-5E25F58F5A93}"/>
+              </a:ext>
+            </a:extLst>
+          </p:cNvPr>
+          <p:cNvCxnSpPr>
+            <a:cxnSpLocks/>
+          </p:cNvCxnSpPr>
+          <p:nvPr/>
+        </p:nvCxnSpPr>
+        <p:spPr>
+          <a:xfrm flipV="1">
+            <a:off x="8433544" y="3531829"/>
+            <a:ext cx="1732479" cy="3210"/>
+          </a:xfrm>
+          <a:prstGeom prst="straightConnector1">
+            <a:avLst/>
+          </a:prstGeom>
+          <a:ln w="19050">
+            <a:solidFill>
+              <a:srgbClr val="0070C0"/>
+            </a:solidFill>
+            <a:prstDash val="sysDash"/>
+            <a:headEnd type="arrow" w="med" len="med"/>
+            <a:tailEnd type="none" w="med" len="med"/>
+          </a:ln>
+        </p:spPr>
+        <p:style>
+          <a:lnRef idx="1">
+            <a:schemeClr val="accent1"/>
+          </a:lnRef>
+          <a:fillRef idx="0">
+            <a:schemeClr val="accent1"/>
+          </a:fillRef>
+          <a:effectRef idx="0">
+            <a:schemeClr val="accent1"/>
+          </a:effectRef>
+          <a:fontRef idx="minor">
+            <a:schemeClr val="tx1"/>
+          </a:fontRef>
+        </p:style>
+      </p:cxnSp>
+      <p:cxnSp>
+        <p:nvCxnSpPr>
+          <p:cNvPr id="68" name="Straight Arrow Connector 67">
+            <a:extLst>
+              <a:ext uri="{FF2B5EF4-FFF2-40B4-BE49-F238E27FC236}">
+                <a16:creationId xmlns:a16="http://schemas.microsoft.com/office/drawing/2014/main" xmlns="" id="{FE3863F3-CCE2-4E4C-8655-346FA37F2632}"/>
+              </a:ext>
+            </a:extLst>
+          </p:cNvPr>
+          <p:cNvCxnSpPr>
+            <a:cxnSpLocks/>
+          </p:cNvCxnSpPr>
+          <p:nvPr/>
+        </p:nvCxnSpPr>
+        <p:spPr>
+          <a:xfrm flipV="1">
+            <a:off x="6639866" y="3648762"/>
+            <a:ext cx="1732479" cy="3210"/>
+          </a:xfrm>
+          <a:prstGeom prst="straightConnector1">
+            <a:avLst/>
+          </a:prstGeom>
+          <a:ln w="19050">
+            <a:solidFill>
+              <a:srgbClr val="0070C0"/>
+            </a:solidFill>
+            <a:prstDash val="sysDash"/>
+            <a:headEnd type="arrow" w="med" len="med"/>
+            <a:tailEnd type="none" w="med" len="med"/>
+          </a:ln>
+        </p:spPr>
+        <p:style>
+          <a:lnRef idx="1">
+            <a:schemeClr val="accent1"/>
+          </a:lnRef>
+          <a:fillRef idx="0">
+            <a:schemeClr val="accent1"/>
+          </a:fillRef>
+          <a:effectRef idx="0">
+            <a:schemeClr val="accent1"/>
+          </a:effectRef>
+          <a:fontRef idx="minor">
+            <a:schemeClr val="tx1"/>
+          </a:fontRef>
+        </p:style>
+      </p:cxnSp>
+      <p:sp>
+        <p:nvSpPr>
+          <p:cNvPr id="70" name="TextBox 69">
+            <a:extLst>
+              <a:ext uri="{FF2B5EF4-FFF2-40B4-BE49-F238E27FC236}">
+                <a16:creationId xmlns:a16="http://schemas.microsoft.com/office/drawing/2014/main" xmlns="" id="{231FB3DF-61B2-4D25-A1C8-A75A41AFB658}"/>
+              </a:ext>
+            </a:extLst>
+          </p:cNvPr>
           <p:cNvSpPr txBox="1"/>
           <p:nvPr/>
         </p:nvSpPr>
         <p:spPr>
           <a:xfrm>
-            <a:off x="6825587" y="4230301"/>
-            <a:ext cx="855809" cy="215444"/>
+            <a:off x="6801349" y="3383210"/>
+            <a:ext cx="779662" cy="215444"/>
           </a:xfrm>
           <a:prstGeom prst="rect">
             <a:avLst/>
@@ -6075,26 +5886,31 @@
           <a:p>
             <a:r>
               <a:rPr lang="en-US" dirty="0"/>
-              <a:t>execute()</a:t>
+              <a:t>s</a:t>
             </a:r>
           </a:p>
         </p:txBody>
       </p:sp>
       <p:cxnSp>
         <p:nvCxnSpPr>
-          <p:cNvPr id="34" name="Straight Arrow Connector 33"/>
+          <p:cNvPr id="71" name="Straight Connector 70">
+            <a:extLst>
+              <a:ext uri="{FF2B5EF4-FFF2-40B4-BE49-F238E27FC236}">
+                <a16:creationId xmlns:a16="http://schemas.microsoft.com/office/drawing/2014/main" xmlns="" id="{27557F21-81F4-4E01-9996-EEC807F58C00}"/>
+              </a:ext>
+            </a:extLst>
+          </p:cNvPr>
           <p:cNvCxnSpPr>
             <a:cxnSpLocks/>
-            <a:endCxn id="21" idx="2"/>
           </p:cNvCxnSpPr>
           <p:nvPr/>
         </p:nvCxnSpPr>
         <p:spPr>
-          <a:xfrm flipV="1">
-            <a:off x="6635318" y="1938172"/>
-            <a:ext cx="1732479" cy="3210"/>
-          </a:xfrm>
-          <a:prstGeom prst="straightConnector1">
+          <a:xfrm>
+            <a:off x="10203185" y="3410430"/>
+            <a:ext cx="0" cy="2690302"/>
+          </a:xfrm>
+          <a:prstGeom prst="line">
             <a:avLst/>
           </a:prstGeom>
           <a:ln w="19050">
@@ -6102,113 +5918,40 @@
               <a:srgbClr val="0070C0"/>
             </a:solidFill>
             <a:prstDash val="sysDash"/>
-            <a:headEnd type="arrow" w="med" len="med"/>
-            <a:tailEnd type="none" w="med" len="med"/>
           </a:ln>
+          <a:effectLst/>
         </p:spPr>
         <p:style>
           <a:lnRef idx="1">
             <a:schemeClr val="accent1"/>
           </a:lnRef>
-          <a:fillRef idx="0">
+          <a:fillRef idx="2">
             <a:schemeClr val="accent1"/>
           </a:fillRef>
-          <a:effectRef idx="0">
+          <a:effectRef idx="1">
             <a:schemeClr val="accent1"/>
           </a:effectRef>
           <a:fontRef idx="minor">
-            <a:schemeClr val="tx1"/>
+            <a:schemeClr val="dk1"/>
           </a:fontRef>
         </p:style>
       </p:cxnSp>
-      <p:cxnSp>
-        <p:nvCxnSpPr>
-          <p:cNvPr id="35" name="Straight Arrow Connector 34"/>
-          <p:cNvCxnSpPr>
-            <a:cxnSpLocks/>
-          </p:cNvCxnSpPr>
-          <p:nvPr/>
-        </p:nvCxnSpPr>
-        <p:spPr>
-          <a:xfrm>
-            <a:off x="4204074" y="3760780"/>
-            <a:ext cx="2348067" cy="0"/>
-          </a:xfrm>
-          <a:prstGeom prst="straightConnector1">
-            <a:avLst/>
-          </a:prstGeom>
-          <a:ln w="19050">
-            <a:solidFill>
-              <a:srgbClr val="0070C0"/>
-            </a:solidFill>
-            <a:prstDash val="sysDash"/>
-            <a:headEnd type="arrow" w="med" len="med"/>
-            <a:tailEnd type="none" w="med" len="med"/>
-          </a:ln>
-        </p:spPr>
-        <p:style>
-          <a:lnRef idx="1">
-            <a:schemeClr val="accent1"/>
-          </a:lnRef>
-          <a:fillRef idx="0">
-            <a:schemeClr val="accent1"/>
-          </a:fillRef>
-          <a:effectRef idx="0">
-            <a:schemeClr val="accent1"/>
-          </a:effectRef>
-          <a:fontRef idx="minor">
-            <a:schemeClr val="tx1"/>
-          </a:fontRef>
-        </p:style>
-      </p:cxnSp>
-      <p:cxnSp>
-        <p:nvCxnSpPr>
-          <p:cNvPr id="37" name="Straight Arrow Connector 36"/>
-          <p:cNvCxnSpPr/>
-          <p:nvPr/>
-        </p:nvCxnSpPr>
-        <p:spPr>
-          <a:xfrm>
-            <a:off x="2856483" y="6358929"/>
-            <a:ext cx="1196051" cy="0"/>
-          </a:xfrm>
-          <a:prstGeom prst="straightConnector1">
-            <a:avLst/>
-          </a:prstGeom>
-          <a:ln w="19050">
-            <a:solidFill>
-              <a:schemeClr val="accent1"/>
-            </a:solidFill>
-            <a:prstDash val="sysDash"/>
-            <a:headEnd type="arrow" w="med" len="med"/>
-            <a:tailEnd type="none" w="med" len="med"/>
-          </a:ln>
-        </p:spPr>
-        <p:style>
-          <a:lnRef idx="1">
-            <a:schemeClr val="accent1"/>
-          </a:lnRef>
-          <a:fillRef idx="0">
-            <a:schemeClr val="accent1"/>
-          </a:fillRef>
-          <a:effectRef idx="0">
-            <a:schemeClr val="accent1"/>
-          </a:effectRef>
-          <a:fontRef idx="minor">
-            <a:schemeClr val="tx1"/>
-          </a:fontRef>
-        </p:style>
-      </p:cxnSp>
-      <p:sp>
-        <p:nvSpPr>
-          <p:cNvPr id="65" name="Rectangle 64"/>
+      <p:sp>
+        <p:nvSpPr>
+          <p:cNvPr id="75" name="Rectangle 74">
+            <a:extLst>
+              <a:ext uri="{FF2B5EF4-FFF2-40B4-BE49-F238E27FC236}">
+                <a16:creationId xmlns:a16="http://schemas.microsoft.com/office/drawing/2014/main" xmlns="" id="{076BC29C-C92A-4216-9A35-54451B02249A}"/>
+              </a:ext>
+            </a:extLst>
+          </p:cNvPr>
           <p:cNvSpPr/>
           <p:nvPr/>
         </p:nvSpPr>
         <p:spPr>
           <a:xfrm>
-            <a:off x="10125422" y="4455338"/>
-            <a:ext cx="168215" cy="1903924"/>
+            <a:off x="11409644" y="6083264"/>
+            <a:ext cx="152400" cy="276003"/>
           </a:xfrm>
           <a:prstGeom prst="rect">
             <a:avLst/>
@@ -6248,211 +5991,30 @@
       </p:sp>
       <p:sp>
         <p:nvSpPr>
-          <p:cNvPr id="79" name="TextBox 78"/>
-          <p:cNvSpPr txBox="1"/>
-          <p:nvPr/>
-        </p:nvSpPr>
-        <p:spPr>
-          <a:xfrm>
-            <a:off x="10247956" y="4232543"/>
-            <a:ext cx="1298078" cy="184666"/>
-          </a:xfrm>
-          <a:prstGeom prst="rect">
-            <a:avLst/>
-          </a:prstGeom>
-          <a:noFill/>
-        </p:spPr>
-        <p:txBody>
-          <a:bodyPr wrap="square" lIns="0" tIns="0" rIns="0" bIns="0" rtlCol="0">
-            <a:spAutoFit/>
-          </a:bodyPr>
-          <a:lstStyle>
-            <a:defPPr>
-              <a:defRPr lang="en-US"/>
-            </a:defPPr>
-            <a:lvl1pPr algn="r">
-              <a:defRPr sz="1400">
-                <a:solidFill>
-                  <a:srgbClr val="0070C0"/>
-                </a:solidFill>
-              </a:defRPr>
-            </a:lvl1pPr>
-          </a:lstStyle>
-          <a:p>
-            <a:r>
-              <a:rPr lang="en-US" sz="1200" dirty="0" err="1">
-                <a:solidFill>
-                  <a:schemeClr val="accent4">
-                    <a:lumMod val="75000"/>
-                  </a:schemeClr>
-                </a:solidFill>
-              </a:rPr>
-              <a:t>setGoal</a:t>
-            </a:r>
-            <a:r>
-              <a:rPr lang="en-US" sz="1200" dirty="0">
-                <a:solidFill>
-                  <a:srgbClr val="7030A0"/>
-                </a:solidFill>
-              </a:rPr>
-              <a:t>(g)</a:t>
-            </a:r>
-            <a:endParaRPr lang="en-US" sz="1200" dirty="0"/>
-          </a:p>
-        </p:txBody>
-      </p:sp>
-      <p:sp>
-        <p:nvSpPr>
-          <p:cNvPr id="80" name="TextBox 79"/>
-          <p:cNvSpPr txBox="1"/>
-          <p:nvPr/>
-        </p:nvSpPr>
-        <p:spPr>
-          <a:xfrm>
-            <a:off x="4303242" y="1133137"/>
-            <a:ext cx="2139871" cy="215444"/>
-          </a:xfrm>
-          <a:prstGeom prst="rect">
-            <a:avLst/>
-          </a:prstGeom>
-          <a:noFill/>
-        </p:spPr>
-        <p:txBody>
-          <a:bodyPr wrap="square" lIns="0" tIns="0" rIns="0" bIns="0" rtlCol="0">
-            <a:spAutoFit/>
-          </a:bodyPr>
-          <a:lstStyle>
-            <a:defPPr>
-              <a:defRPr lang="en-US"/>
-            </a:defPPr>
-            <a:lvl1pPr algn="r">
-              <a:defRPr sz="1400">
-                <a:solidFill>
-                  <a:srgbClr val="0070C0"/>
-                </a:solidFill>
-              </a:defRPr>
-            </a:lvl1pPr>
-          </a:lstStyle>
-          <a:p>
-            <a:r>
-              <a:rPr lang="en-US" dirty="0" err="1"/>
-              <a:t>parseCommand</a:t>
-            </a:r>
-            <a:r>
-              <a:rPr lang="en-US" dirty="0"/>
-              <a:t>(“</a:t>
-            </a:r>
-            <a:r>
-              <a:rPr lang="en-US" dirty="0" err="1"/>
-              <a:t>setGoal</a:t>
-            </a:r>
-            <a:r>
-              <a:rPr lang="en-US" dirty="0"/>
-              <a:t> …”)</a:t>
-            </a:r>
-          </a:p>
-        </p:txBody>
-      </p:sp>
-      <p:sp>
-        <p:nvSpPr>
-          <p:cNvPr id="82" name="TextBox 81"/>
-          <p:cNvSpPr txBox="1"/>
-          <p:nvPr/>
-        </p:nvSpPr>
-        <p:spPr>
-          <a:xfrm>
-            <a:off x="6770823" y="6090941"/>
-            <a:ext cx="621216" cy="215444"/>
-          </a:xfrm>
-          <a:prstGeom prst="rect">
-            <a:avLst/>
-          </a:prstGeom>
-          <a:noFill/>
-        </p:spPr>
-        <p:txBody>
-          <a:bodyPr wrap="square" lIns="0" tIns="0" rIns="0" bIns="0" rtlCol="0">
-            <a:spAutoFit/>
-          </a:bodyPr>
-          <a:lstStyle>
-            <a:defPPr>
-              <a:defRPr lang="en-US"/>
-            </a:defPPr>
-            <a:lvl1pPr algn="r">
-              <a:defRPr sz="1400">
-                <a:solidFill>
-                  <a:srgbClr val="0070C0"/>
-                </a:solidFill>
-              </a:defRPr>
-            </a:lvl1pPr>
-          </a:lstStyle>
-          <a:p>
-            <a:r>
-              <a:rPr lang="en-US" dirty="0"/>
-              <a:t>result</a:t>
-            </a:r>
-          </a:p>
-        </p:txBody>
-      </p:sp>
-      <p:sp>
-        <p:nvSpPr>
-          <p:cNvPr id="83" name="TextBox 82"/>
-          <p:cNvSpPr txBox="1"/>
-          <p:nvPr/>
-        </p:nvSpPr>
-        <p:spPr>
-          <a:xfrm>
-            <a:off x="3120749" y="6113830"/>
-            <a:ext cx="762000" cy="215444"/>
-          </a:xfrm>
-          <a:prstGeom prst="rect">
-            <a:avLst/>
-          </a:prstGeom>
-          <a:noFill/>
-        </p:spPr>
-        <p:txBody>
-          <a:bodyPr wrap="square" lIns="0" tIns="0" rIns="0" bIns="0" rtlCol="0">
-            <a:spAutoFit/>
-          </a:bodyPr>
-          <a:lstStyle>
-            <a:defPPr>
-              <a:defRPr lang="en-US"/>
-            </a:defPPr>
-            <a:lvl1pPr algn="r">
-              <a:defRPr sz="1400">
-                <a:solidFill>
-                  <a:srgbClr val="0070C0"/>
-                </a:solidFill>
-              </a:defRPr>
-            </a:lvl1pPr>
-          </a:lstStyle>
-          <a:p>
-            <a:r>
-              <a:rPr lang="en-US" dirty="0"/>
-              <a:t>result</a:t>
-            </a:r>
-          </a:p>
-        </p:txBody>
-      </p:sp>
-      <p:sp>
-        <p:nvSpPr>
-          <p:cNvPr id="84" name="Rectangle 62"/>
+          <p:cNvPr id="76" name="Rectangle 62">
+            <a:extLst>
+              <a:ext uri="{FF2B5EF4-FFF2-40B4-BE49-F238E27FC236}">
+                <a16:creationId xmlns:a16="http://schemas.microsoft.com/office/drawing/2014/main" xmlns="" id="{FA66D03F-6E37-485C-8486-452E48708909}"/>
+              </a:ext>
+            </a:extLst>
+          </p:cNvPr>
           <p:cNvSpPr/>
           <p:nvPr/>
         </p:nvSpPr>
         <p:spPr>
           <a:xfrm>
-            <a:off x="14219743" y="4308778"/>
-            <a:ext cx="967878" cy="335427"/>
+            <a:off x="10649961" y="5645284"/>
+            <a:ext cx="1600379" cy="491077"/>
           </a:xfrm>
           <a:prstGeom prst="rect">
             <a:avLst/>
           </a:prstGeom>
           <a:solidFill>
-            <a:srgbClr val="7030A0"/>
+            <a:srgbClr val="0070C0"/>
           </a:solidFill>
           <a:ln w="19050">
             <a:solidFill>
-              <a:srgbClr val="7030A0"/>
+              <a:srgbClr val="0070C0"/>
             </a:solidFill>
           </a:ln>
           <a:effectLst/>
@@ -6477,1529 +6039,6 @@
           <a:p>
             <a:pPr algn="ctr"/>
             <a:r>
-              <a:rPr lang="en-US" sz="1600" dirty="0">
-                <a:solidFill>
-                  <a:schemeClr val="bg1"/>
-                </a:solidFill>
-              </a:rPr>
-              <a:t>:</a:t>
-            </a:r>
-            <a:r>
-              <a:rPr lang="en-US" sz="1600" dirty="0" err="1">
-                <a:solidFill>
-                  <a:schemeClr val="bg1"/>
-                </a:solidFill>
-              </a:rPr>
-              <a:t>EPiggy</a:t>
-            </a:r>
-            <a:endParaRPr lang="en-SG" sz="1600" dirty="0">
-              <a:solidFill>
-                <a:schemeClr val="bg1"/>
-              </a:solidFill>
-            </a:endParaRPr>
-          </a:p>
-        </p:txBody>
-      </p:sp>
-      <p:sp>
-        <p:nvSpPr>
-          <p:cNvPr id="86" name="Rectangle 85"/>
-          <p:cNvSpPr/>
-          <p:nvPr/>
-        </p:nvSpPr>
-        <p:spPr>
-          <a:xfrm>
-            <a:off x="14629848" y="4923007"/>
-            <a:ext cx="129933" cy="398562"/>
-          </a:xfrm>
-          <a:prstGeom prst="rect">
-            <a:avLst/>
-          </a:prstGeom>
-          <a:solidFill>
-            <a:srgbClr val="7030A0"/>
-          </a:solidFill>
-          <a:ln>
-            <a:solidFill>
-              <a:srgbClr val="7030A0"/>
-            </a:solidFill>
-          </a:ln>
-          <a:effectLst/>
-        </p:spPr>
-        <p:style>
-          <a:lnRef idx="1">
-            <a:schemeClr val="accent3"/>
-          </a:lnRef>
-          <a:fillRef idx="2">
-            <a:schemeClr val="accent3"/>
-          </a:fillRef>
-          <a:effectRef idx="1">
-            <a:schemeClr val="accent3"/>
-          </a:effectRef>
-          <a:fontRef idx="minor">
-            <a:schemeClr val="dk1"/>
-          </a:fontRef>
-        </p:style>
-        <p:txBody>
-          <a:bodyPr rtlCol="0" anchor="ctr"/>
-          <a:lstStyle/>
-          <a:p>
-            <a:pPr algn="ctr"/>
-            <a:endParaRPr lang="en-SG" sz="1400"/>
-          </a:p>
-        </p:txBody>
-      </p:sp>
-      <p:sp>
-        <p:nvSpPr>
-          <p:cNvPr id="40" name="Rectangle 62"/>
-          <p:cNvSpPr/>
-          <p:nvPr/>
-        </p:nvSpPr>
-        <p:spPr>
-          <a:xfrm>
-            <a:off x="12665403" y="533761"/>
-            <a:ext cx="841636" cy="300180"/>
-          </a:xfrm>
-          <a:prstGeom prst="rect">
-            <a:avLst/>
-          </a:prstGeom>
-          <a:solidFill>
-            <a:srgbClr val="7030A0"/>
-          </a:solidFill>
-          <a:ln w="19050">
-            <a:solidFill>
-              <a:srgbClr val="7030A0"/>
-            </a:solidFill>
-          </a:ln>
-          <a:effectLst/>
-        </p:spPr>
-        <p:style>
-          <a:lnRef idx="1">
-            <a:schemeClr val="accent2"/>
-          </a:lnRef>
-          <a:fillRef idx="2">
-            <a:schemeClr val="accent2"/>
-          </a:fillRef>
-          <a:effectRef idx="1">
-            <a:schemeClr val="accent2"/>
-          </a:effectRef>
-          <a:fontRef idx="minor">
-            <a:schemeClr val="dk1"/>
-          </a:fontRef>
-        </p:style>
-        <p:txBody>
-          <a:bodyPr rtlCol="0" anchor="ctr"/>
-          <a:lstStyle/>
-          <a:p>
-            <a:pPr algn="ctr"/>
-            <a:r>
-              <a:rPr lang="en-US" sz="1600" dirty="0">
-                <a:solidFill>
-                  <a:schemeClr val="bg1"/>
-                </a:solidFill>
-              </a:rPr>
-              <a:t>: Model</a:t>
-            </a:r>
-            <a:endParaRPr lang="en-SG" sz="1600" dirty="0">
-              <a:solidFill>
-                <a:schemeClr val="bg1"/>
-              </a:solidFill>
-            </a:endParaRPr>
-          </a:p>
-        </p:txBody>
-      </p:sp>
-      <p:cxnSp>
-        <p:nvCxnSpPr>
-          <p:cNvPr id="46" name="Straight Connector 45"/>
-          <p:cNvCxnSpPr>
-            <a:cxnSpLocks/>
-            <a:stCxn id="40" idx="2"/>
-          </p:cNvCxnSpPr>
-          <p:nvPr/>
-        </p:nvCxnSpPr>
-        <p:spPr>
-          <a:xfrm>
-            <a:off x="13086221" y="833941"/>
-            <a:ext cx="0" cy="4706446"/>
-          </a:xfrm>
-          <a:prstGeom prst="line">
-            <a:avLst/>
-          </a:prstGeom>
-          <a:ln w="19050">
-            <a:solidFill>
-              <a:srgbClr val="7030A0"/>
-            </a:solidFill>
-            <a:prstDash val="sysDash"/>
-          </a:ln>
-          <a:effectLst/>
-        </p:spPr>
-        <p:style>
-          <a:lnRef idx="1">
-            <a:schemeClr val="accent1"/>
-          </a:lnRef>
-          <a:fillRef idx="2">
-            <a:schemeClr val="accent1"/>
-          </a:fillRef>
-          <a:effectRef idx="1">
-            <a:schemeClr val="accent1"/>
-          </a:effectRef>
-          <a:fontRef idx="minor">
-            <a:schemeClr val="dk1"/>
-          </a:fontRef>
-        </p:style>
-      </p:cxnSp>
-      <p:sp>
-        <p:nvSpPr>
-          <p:cNvPr id="49" name="Rectangle 48"/>
-          <p:cNvSpPr/>
-          <p:nvPr/>
-        </p:nvSpPr>
-        <p:spPr>
-          <a:xfrm>
-            <a:off x="13003165" y="4445745"/>
-            <a:ext cx="156464" cy="915242"/>
-          </a:xfrm>
-          <a:prstGeom prst="rect">
-            <a:avLst/>
-          </a:prstGeom>
-          <a:solidFill>
-            <a:srgbClr val="7030A0"/>
-          </a:solidFill>
-          <a:ln>
-            <a:solidFill>
-              <a:srgbClr val="7030A0"/>
-            </a:solidFill>
-          </a:ln>
-          <a:effectLst/>
-        </p:spPr>
-        <p:style>
-          <a:lnRef idx="1">
-            <a:schemeClr val="accent3"/>
-          </a:lnRef>
-          <a:fillRef idx="2">
-            <a:schemeClr val="accent3"/>
-          </a:fillRef>
-          <a:effectRef idx="1">
-            <a:schemeClr val="accent3"/>
-          </a:effectRef>
-          <a:fontRef idx="minor">
-            <a:schemeClr val="dk1"/>
-          </a:fontRef>
-        </p:style>
-        <p:txBody>
-          <a:bodyPr rtlCol="0" anchor="ctr"/>
-          <a:lstStyle/>
-          <a:p>
-            <a:pPr algn="ctr"/>
-            <a:endParaRPr lang="en-SG" sz="1400" dirty="0"/>
-          </a:p>
-        </p:txBody>
-      </p:sp>
-      <p:cxnSp>
-        <p:nvCxnSpPr>
-          <p:cNvPr id="50" name="Straight Arrow Connector 49"/>
-          <p:cNvCxnSpPr>
-            <a:cxnSpLocks/>
-          </p:cNvCxnSpPr>
-          <p:nvPr/>
-        </p:nvCxnSpPr>
-        <p:spPr>
-          <a:xfrm>
-            <a:off x="10282163" y="4459643"/>
-            <a:ext cx="2724876" cy="0"/>
-          </a:xfrm>
-          <a:prstGeom prst="straightConnector1">
-            <a:avLst/>
-          </a:prstGeom>
-          <a:ln w="19050">
-            <a:solidFill>
-              <a:srgbClr val="0070C0"/>
-            </a:solidFill>
-            <a:tailEnd type="arrow"/>
-          </a:ln>
-        </p:spPr>
-        <p:style>
-          <a:lnRef idx="1">
-            <a:schemeClr val="accent1"/>
-          </a:lnRef>
-          <a:fillRef idx="0">
-            <a:schemeClr val="accent1"/>
-          </a:fillRef>
-          <a:effectRef idx="0">
-            <a:schemeClr val="accent1"/>
-          </a:effectRef>
-          <a:fontRef idx="minor">
-            <a:schemeClr val="tx1"/>
-          </a:fontRef>
-        </p:style>
-      </p:cxnSp>
-      <p:sp>
-        <p:nvSpPr>
-          <p:cNvPr id="4" name="TextBox 3"/>
-          <p:cNvSpPr txBox="1"/>
-          <p:nvPr/>
-        </p:nvSpPr>
-        <p:spPr>
-          <a:xfrm>
-            <a:off x="8237147" y="3807837"/>
-            <a:ext cx="258404" cy="261610"/>
-          </a:xfrm>
-          <a:prstGeom prst="rect">
-            <a:avLst/>
-          </a:prstGeom>
-          <a:noFill/>
-        </p:spPr>
-        <p:txBody>
-          <a:bodyPr wrap="none" rtlCol="0">
-            <a:spAutoFit/>
-          </a:bodyPr>
-          <a:lstStyle/>
-          <a:p>
-            <a:r>
-              <a:rPr lang="en-SG" sz="1100" dirty="0">
-                <a:solidFill>
-                  <a:srgbClr val="002060"/>
-                </a:solidFill>
-              </a:rPr>
-              <a:t>X</a:t>
-            </a:r>
-          </a:p>
-        </p:txBody>
-      </p:sp>
-      <p:sp>
-        <p:nvSpPr>
-          <p:cNvPr id="19" name="Rectangle 62"/>
-          <p:cNvSpPr/>
-          <p:nvPr/>
-        </p:nvSpPr>
-        <p:spPr>
-          <a:xfrm>
-            <a:off x="7571087" y="1244747"/>
-            <a:ext cx="1593421" cy="461538"/>
-          </a:xfrm>
-          <a:prstGeom prst="rect">
-            <a:avLst/>
-          </a:prstGeom>
-          <a:solidFill>
-            <a:srgbClr val="0070C0"/>
-          </a:solidFill>
-          <a:ln w="19050">
-            <a:solidFill>
-              <a:srgbClr val="0070C0"/>
-            </a:solidFill>
-          </a:ln>
-          <a:effectLst/>
-        </p:spPr>
-        <p:style>
-          <a:lnRef idx="1">
-            <a:schemeClr val="accent2"/>
-          </a:lnRef>
-          <a:fillRef idx="2">
-            <a:schemeClr val="accent2"/>
-          </a:fillRef>
-          <a:effectRef idx="1">
-            <a:schemeClr val="accent2"/>
-          </a:effectRef>
-          <a:fontRef idx="minor">
-            <a:schemeClr val="dk1"/>
-          </a:fontRef>
-        </p:style>
-        <p:txBody>
-          <a:bodyPr rtlCol="0" anchor="ctr"/>
-          <a:lstStyle/>
-          <a:p>
-            <a:pPr algn="ctr"/>
-            <a:r>
-              <a:rPr lang="en-US" sz="1600" dirty="0">
-                <a:solidFill>
-                  <a:schemeClr val="bg1"/>
-                </a:solidFill>
-              </a:rPr>
-              <a:t>:SetGoal</a:t>
-            </a:r>
-          </a:p>
-          <a:p>
-            <a:pPr algn="ctr"/>
-            <a:r>
-              <a:rPr lang="en-US" sz="1600" dirty="0" err="1">
-                <a:solidFill>
-                  <a:schemeClr val="bg1"/>
-                </a:solidFill>
-              </a:rPr>
-              <a:t>CommandParser</a:t>
-            </a:r>
-            <a:endParaRPr lang="en-SG" sz="1600" dirty="0">
-              <a:solidFill>
-                <a:schemeClr val="bg1"/>
-              </a:solidFill>
-            </a:endParaRPr>
-          </a:p>
-        </p:txBody>
-      </p:sp>
-      <p:cxnSp>
-        <p:nvCxnSpPr>
-          <p:cNvPr id="66" name="Straight Arrow Connector 65">
-            <a:extLst>
-              <a:ext uri="{FF2B5EF4-FFF2-40B4-BE49-F238E27FC236}">
-                <a16:creationId xmlns:a16="http://schemas.microsoft.com/office/drawing/2014/main" id="{39916E2E-195A-4DC8-B025-B05FA87E6796}"/>
-              </a:ext>
-            </a:extLst>
-          </p:cNvPr>
-          <p:cNvCxnSpPr>
-            <a:cxnSpLocks/>
-          </p:cNvCxnSpPr>
-          <p:nvPr/>
-        </p:nvCxnSpPr>
-        <p:spPr>
-          <a:xfrm>
-            <a:off x="4204069" y="4480625"/>
-            <a:ext cx="5928062" cy="0"/>
-          </a:xfrm>
-          <a:prstGeom prst="straightConnector1">
-            <a:avLst/>
-          </a:prstGeom>
-          <a:ln w="19050">
-            <a:solidFill>
-              <a:srgbClr val="0070C0"/>
-            </a:solidFill>
-            <a:tailEnd type="arrow"/>
-          </a:ln>
-        </p:spPr>
-        <p:style>
-          <a:lnRef idx="1">
-            <a:schemeClr val="accent1"/>
-          </a:lnRef>
-          <a:fillRef idx="0">
-            <a:schemeClr val="accent1"/>
-          </a:fillRef>
-          <a:effectRef idx="0">
-            <a:schemeClr val="accent1"/>
-          </a:effectRef>
-          <a:fontRef idx="minor">
-            <a:schemeClr val="tx1"/>
-          </a:fontRef>
-        </p:style>
-      </p:cxnSp>
-      <p:cxnSp>
-        <p:nvCxnSpPr>
-          <p:cNvPr id="67" name="Straight Arrow Connector 66">
-            <a:extLst>
-              <a:ext uri="{FF2B5EF4-FFF2-40B4-BE49-F238E27FC236}">
-                <a16:creationId xmlns:a16="http://schemas.microsoft.com/office/drawing/2014/main" id="{D881596E-177C-4FDC-8E60-CAB90B3D5FAB}"/>
-              </a:ext>
-            </a:extLst>
-          </p:cNvPr>
-          <p:cNvCxnSpPr>
-            <a:cxnSpLocks/>
-          </p:cNvCxnSpPr>
-          <p:nvPr/>
-        </p:nvCxnSpPr>
-        <p:spPr>
-          <a:xfrm>
-            <a:off x="4220968" y="1390910"/>
-            <a:ext cx="2256705" cy="1"/>
-          </a:xfrm>
-          <a:prstGeom prst="straightConnector1">
-            <a:avLst/>
-          </a:prstGeom>
-          <a:ln w="19050">
-            <a:solidFill>
-              <a:srgbClr val="0070C0"/>
-            </a:solidFill>
-            <a:tailEnd type="arrow"/>
-          </a:ln>
-        </p:spPr>
-        <p:style>
-          <a:lnRef idx="1">
-            <a:schemeClr val="accent1"/>
-          </a:lnRef>
-          <a:fillRef idx="0">
-            <a:schemeClr val="accent1"/>
-          </a:fillRef>
-          <a:effectRef idx="0">
-            <a:schemeClr val="accent1"/>
-          </a:effectRef>
-          <a:fontRef idx="minor">
-            <a:schemeClr val="tx1"/>
-          </a:fontRef>
-        </p:style>
-      </p:cxnSp>
-      <p:cxnSp>
-        <p:nvCxnSpPr>
-          <p:cNvPr id="69" name="Straight Arrow Connector 68">
-            <a:extLst>
-              <a:ext uri="{FF2B5EF4-FFF2-40B4-BE49-F238E27FC236}">
-                <a16:creationId xmlns:a16="http://schemas.microsoft.com/office/drawing/2014/main" id="{7C9F21BC-13A9-471F-825A-2621FD36355F}"/>
-              </a:ext>
-            </a:extLst>
-          </p:cNvPr>
-          <p:cNvCxnSpPr>
-            <a:cxnSpLocks/>
-          </p:cNvCxnSpPr>
-          <p:nvPr/>
-        </p:nvCxnSpPr>
-        <p:spPr>
-          <a:xfrm>
-            <a:off x="4220968" y="6359262"/>
-            <a:ext cx="6002775" cy="0"/>
-          </a:xfrm>
-          <a:prstGeom prst="straightConnector1">
-            <a:avLst/>
-          </a:prstGeom>
-          <a:ln w="19050">
-            <a:solidFill>
-              <a:srgbClr val="0070C0"/>
-            </a:solidFill>
-            <a:prstDash val="sysDash"/>
-            <a:headEnd type="arrow" w="med" len="med"/>
-            <a:tailEnd type="none" w="med" len="med"/>
-          </a:ln>
-        </p:spPr>
-        <p:style>
-          <a:lnRef idx="1">
-            <a:schemeClr val="accent1"/>
-          </a:lnRef>
-          <a:fillRef idx="0">
-            <a:schemeClr val="accent1"/>
-          </a:fillRef>
-          <a:effectRef idx="0">
-            <a:schemeClr val="accent1"/>
-          </a:effectRef>
-          <a:fontRef idx="minor">
-            <a:schemeClr val="tx1"/>
-          </a:fontRef>
-        </p:style>
-      </p:cxnSp>
-      <p:cxnSp>
-        <p:nvCxnSpPr>
-          <p:cNvPr id="89" name="Straight Connector 88">
-            <a:extLst>
-              <a:ext uri="{FF2B5EF4-FFF2-40B4-BE49-F238E27FC236}">
-                <a16:creationId xmlns:a16="http://schemas.microsoft.com/office/drawing/2014/main" id="{E4E1C8CA-49DF-45D8-80A5-D5C8282EE927}"/>
-              </a:ext>
-            </a:extLst>
-          </p:cNvPr>
-          <p:cNvCxnSpPr>
-            <a:cxnSpLocks/>
-          </p:cNvCxnSpPr>
-          <p:nvPr/>
-        </p:nvCxnSpPr>
-        <p:spPr>
-          <a:xfrm flipH="1">
-            <a:off x="14703255" y="4611522"/>
-            <a:ext cx="429" cy="915242"/>
-          </a:xfrm>
-          <a:prstGeom prst="line">
-            <a:avLst/>
-          </a:prstGeom>
-          <a:ln w="19050">
-            <a:solidFill>
-              <a:srgbClr val="7030A0"/>
-            </a:solidFill>
-            <a:prstDash val="sysDash"/>
-          </a:ln>
-          <a:effectLst/>
-        </p:spPr>
-        <p:style>
-          <a:lnRef idx="1">
-            <a:schemeClr val="accent1"/>
-          </a:lnRef>
-          <a:fillRef idx="2">
-            <a:schemeClr val="accent1"/>
-          </a:fillRef>
-          <a:effectRef idx="1">
-            <a:schemeClr val="accent1"/>
-          </a:effectRef>
-          <a:fontRef idx="minor">
-            <a:schemeClr val="dk1"/>
-          </a:fontRef>
-        </p:style>
-      </p:cxnSp>
-      <p:sp>
-        <p:nvSpPr>
-          <p:cNvPr id="41" name="TextBox 40"/>
-          <p:cNvSpPr txBox="1"/>
-          <p:nvPr/>
-        </p:nvSpPr>
-        <p:spPr>
-          <a:xfrm>
-            <a:off x="13507042" y="4715511"/>
-            <a:ext cx="827977" cy="184666"/>
-          </a:xfrm>
-          <a:prstGeom prst="rect">
-            <a:avLst/>
-          </a:prstGeom>
-          <a:noFill/>
-          <a:ln>
-            <a:noFill/>
-          </a:ln>
-        </p:spPr>
-        <p:txBody>
-          <a:bodyPr wrap="square" lIns="0" tIns="0" rIns="0" bIns="0" rtlCol="0">
-            <a:spAutoFit/>
-          </a:bodyPr>
-          <a:lstStyle>
-            <a:defPPr>
-              <a:defRPr lang="en-US"/>
-            </a:defPPr>
-            <a:lvl1pPr algn="r">
-              <a:defRPr sz="1400">
-                <a:solidFill>
-                  <a:srgbClr val="0070C0"/>
-                </a:solidFill>
-              </a:defRPr>
-            </a:lvl1pPr>
-          </a:lstStyle>
-          <a:p>
-            <a:r>
-              <a:rPr lang="en-US" sz="1200" dirty="0" err="1">
-                <a:solidFill>
-                  <a:srgbClr val="7030A0"/>
-                </a:solidFill>
-              </a:rPr>
-              <a:t>setGoal</a:t>
-            </a:r>
-            <a:r>
-              <a:rPr lang="en-US" sz="1200" dirty="0">
-                <a:solidFill>
-                  <a:schemeClr val="accent4">
-                    <a:lumMod val="75000"/>
-                  </a:schemeClr>
-                </a:solidFill>
-              </a:rPr>
-              <a:t>()</a:t>
-            </a:r>
-          </a:p>
-        </p:txBody>
-      </p:sp>
-      <p:cxnSp>
-        <p:nvCxnSpPr>
-          <p:cNvPr id="52" name="Straight Arrow Connector 51"/>
-          <p:cNvCxnSpPr>
-            <a:cxnSpLocks/>
-          </p:cNvCxnSpPr>
-          <p:nvPr/>
-        </p:nvCxnSpPr>
-        <p:spPr>
-          <a:xfrm>
-            <a:off x="13159629" y="4923006"/>
-            <a:ext cx="1470216" cy="0"/>
-          </a:xfrm>
-          <a:prstGeom prst="straightConnector1">
-            <a:avLst/>
-          </a:prstGeom>
-          <a:ln w="19050">
-            <a:solidFill>
-              <a:srgbClr val="7030A0"/>
-            </a:solidFill>
-            <a:tailEnd type="arrow"/>
-          </a:ln>
-        </p:spPr>
-        <p:style>
-          <a:lnRef idx="1">
-            <a:schemeClr val="accent1"/>
-          </a:lnRef>
-          <a:fillRef idx="0">
-            <a:schemeClr val="accent1"/>
-          </a:fillRef>
-          <a:effectRef idx="0">
-            <a:schemeClr val="accent1"/>
-          </a:effectRef>
-          <a:fontRef idx="minor">
-            <a:schemeClr val="tx1"/>
-          </a:fontRef>
-        </p:style>
-      </p:cxnSp>
-      <p:cxnSp>
-        <p:nvCxnSpPr>
-          <p:cNvPr id="60" name="Straight Arrow Connector 59">
-            <a:extLst>
-              <a:ext uri="{FF2B5EF4-FFF2-40B4-BE49-F238E27FC236}">
-                <a16:creationId xmlns:a16="http://schemas.microsoft.com/office/drawing/2014/main" id="{7C9F21BC-13A9-471F-825A-2621FD36355F}"/>
-              </a:ext>
-            </a:extLst>
-          </p:cNvPr>
-          <p:cNvCxnSpPr>
-            <a:cxnSpLocks/>
-          </p:cNvCxnSpPr>
-          <p:nvPr/>
-        </p:nvCxnSpPr>
-        <p:spPr>
-          <a:xfrm flipV="1">
-            <a:off x="13159629" y="5305086"/>
-            <a:ext cx="1470216" cy="6325"/>
-          </a:xfrm>
-          <a:prstGeom prst="straightConnector1">
-            <a:avLst/>
-          </a:prstGeom>
-          <a:ln w="19050">
-            <a:solidFill>
-              <a:srgbClr val="7030A0"/>
-            </a:solidFill>
-            <a:prstDash val="sysDash"/>
-            <a:headEnd type="arrow" w="med" len="med"/>
-            <a:tailEnd type="none" w="med" len="med"/>
-          </a:ln>
-        </p:spPr>
-        <p:style>
-          <a:lnRef idx="1">
-            <a:schemeClr val="accent1"/>
-          </a:lnRef>
-          <a:fillRef idx="0">
-            <a:schemeClr val="accent1"/>
-          </a:fillRef>
-          <a:effectRef idx="0">
-            <a:schemeClr val="accent1"/>
-          </a:effectRef>
-          <a:fontRef idx="minor">
-            <a:schemeClr val="tx1"/>
-          </a:fontRef>
-        </p:style>
-      </p:cxnSp>
-      <p:cxnSp>
-        <p:nvCxnSpPr>
-          <p:cNvPr id="63" name="Straight Arrow Connector 62">
-            <a:extLst>
-              <a:ext uri="{FF2B5EF4-FFF2-40B4-BE49-F238E27FC236}">
-                <a16:creationId xmlns:a16="http://schemas.microsoft.com/office/drawing/2014/main" id="{7C9F21BC-13A9-471F-825A-2621FD36355F}"/>
-              </a:ext>
-            </a:extLst>
-          </p:cNvPr>
-          <p:cNvCxnSpPr>
-            <a:cxnSpLocks/>
-          </p:cNvCxnSpPr>
-          <p:nvPr/>
-        </p:nvCxnSpPr>
-        <p:spPr>
-          <a:xfrm>
-            <a:off x="10294585" y="5360987"/>
-            <a:ext cx="2791639" cy="0"/>
-          </a:xfrm>
-          <a:prstGeom prst="straightConnector1">
-            <a:avLst/>
-          </a:prstGeom>
-          <a:ln w="19050">
-            <a:solidFill>
-              <a:srgbClr val="7030A0"/>
-            </a:solidFill>
-            <a:prstDash val="sysDash"/>
-            <a:headEnd type="arrow" w="med" len="med"/>
-            <a:tailEnd type="none" w="med" len="med"/>
-          </a:ln>
-        </p:spPr>
-        <p:style>
-          <a:lnRef idx="1">
-            <a:schemeClr val="accent1"/>
-          </a:lnRef>
-          <a:fillRef idx="0">
-            <a:schemeClr val="accent1"/>
-          </a:fillRef>
-          <a:effectRef idx="0">
-            <a:schemeClr val="accent1"/>
-          </a:effectRef>
-          <a:fontRef idx="minor">
-            <a:schemeClr val="tx1"/>
-          </a:fontRef>
-        </p:style>
-      </p:cxnSp>
-      <p:sp>
-        <p:nvSpPr>
-          <p:cNvPr id="47" name="Rectangle 46">
-            <a:extLst>
-              <a:ext uri="{FF2B5EF4-FFF2-40B4-BE49-F238E27FC236}">
-                <a16:creationId xmlns:a16="http://schemas.microsoft.com/office/drawing/2014/main" id="{95A285D9-C4C4-4CBF-A454-E8A6C3B934B1}"/>
-              </a:ext>
-            </a:extLst>
-          </p:cNvPr>
-          <p:cNvSpPr/>
-          <p:nvPr/>
-        </p:nvSpPr>
-        <p:spPr>
-          <a:xfrm>
-            <a:off x="8291597" y="2160587"/>
-            <a:ext cx="149515" cy="1500018"/>
-          </a:xfrm>
-          <a:prstGeom prst="rect">
-            <a:avLst/>
-          </a:prstGeom>
-          <a:solidFill>
-            <a:srgbClr val="0070C0"/>
-          </a:solidFill>
-          <a:ln>
-            <a:solidFill>
-              <a:srgbClr val="0070C0"/>
-            </a:solidFill>
-          </a:ln>
-          <a:effectLst/>
-        </p:spPr>
-        <p:style>
-          <a:lnRef idx="1">
-            <a:schemeClr val="accent3"/>
-          </a:lnRef>
-          <a:fillRef idx="2">
-            <a:schemeClr val="accent3"/>
-          </a:fillRef>
-          <a:effectRef idx="1">
-            <a:schemeClr val="accent3"/>
-          </a:effectRef>
-          <a:fontRef idx="minor">
-            <a:schemeClr val="dk1"/>
-          </a:fontRef>
-        </p:style>
-        <p:txBody>
-          <a:bodyPr rtlCol="0" anchor="ctr"/>
-          <a:lstStyle/>
-          <a:p>
-            <a:pPr algn="ctr"/>
-            <a:endParaRPr lang="en-SG" sz="1400"/>
-          </a:p>
-        </p:txBody>
-      </p:sp>
-      <p:cxnSp>
-        <p:nvCxnSpPr>
-          <p:cNvPr id="51" name="Straight Arrow Connector 50">
-            <a:extLst>
-              <a:ext uri="{FF2B5EF4-FFF2-40B4-BE49-F238E27FC236}">
-                <a16:creationId xmlns:a16="http://schemas.microsoft.com/office/drawing/2014/main" id="{39A494C5-24CF-48AE-8A0C-40894D902288}"/>
-              </a:ext>
-            </a:extLst>
-          </p:cNvPr>
-          <p:cNvCxnSpPr>
-            <a:cxnSpLocks/>
-          </p:cNvCxnSpPr>
-          <p:nvPr/>
-        </p:nvCxnSpPr>
-        <p:spPr>
-          <a:xfrm>
-            <a:off x="6654840" y="2171481"/>
-            <a:ext cx="1653140" cy="1"/>
-          </a:xfrm>
-          <a:prstGeom prst="straightConnector1">
-            <a:avLst/>
-          </a:prstGeom>
-          <a:ln w="19050">
-            <a:solidFill>
-              <a:srgbClr val="0070C0"/>
-            </a:solidFill>
-            <a:tailEnd type="arrow"/>
-          </a:ln>
-        </p:spPr>
-        <p:style>
-          <a:lnRef idx="1">
-            <a:schemeClr val="accent1"/>
-          </a:lnRef>
-          <a:fillRef idx="0">
-            <a:schemeClr val="accent1"/>
-          </a:fillRef>
-          <a:effectRef idx="0">
-            <a:schemeClr val="accent1"/>
-          </a:effectRef>
-          <a:fontRef idx="minor">
-            <a:schemeClr val="tx1"/>
-          </a:fontRef>
-        </p:style>
-      </p:cxnSp>
-      <p:sp>
-        <p:nvSpPr>
-          <p:cNvPr id="53" name="TextBox 52">
-            <a:extLst>
-              <a:ext uri="{FF2B5EF4-FFF2-40B4-BE49-F238E27FC236}">
-                <a16:creationId xmlns:a16="http://schemas.microsoft.com/office/drawing/2014/main" id="{BBBBF940-F5BB-462D-9488-8F4D704067A3}"/>
-              </a:ext>
-            </a:extLst>
-          </p:cNvPr>
-          <p:cNvSpPr txBox="1"/>
-          <p:nvPr/>
-        </p:nvSpPr>
-        <p:spPr>
-          <a:xfrm>
-            <a:off x="6011501" y="2191257"/>
-            <a:ext cx="2139871" cy="215444"/>
-          </a:xfrm>
-          <a:prstGeom prst="rect">
-            <a:avLst/>
-          </a:prstGeom>
-          <a:noFill/>
-        </p:spPr>
-        <p:txBody>
-          <a:bodyPr wrap="square" lIns="0" tIns="0" rIns="0" bIns="0" rtlCol="0">
-            <a:spAutoFit/>
-          </a:bodyPr>
-          <a:lstStyle>
-            <a:defPPr>
-              <a:defRPr lang="en-US"/>
-            </a:defPPr>
-            <a:lvl1pPr algn="r">
-              <a:defRPr sz="1400">
-                <a:solidFill>
-                  <a:srgbClr val="0070C0"/>
-                </a:solidFill>
-              </a:defRPr>
-            </a:lvl1pPr>
-          </a:lstStyle>
-          <a:p>
-            <a:r>
-              <a:rPr lang="en-US" dirty="0"/>
-              <a:t>parse(arguments)</a:t>
-            </a:r>
-          </a:p>
-        </p:txBody>
-      </p:sp>
-      <p:sp>
-        <p:nvSpPr>
-          <p:cNvPr id="54" name="Rectangle 53">
-            <a:extLst>
-              <a:ext uri="{FF2B5EF4-FFF2-40B4-BE49-F238E27FC236}">
-                <a16:creationId xmlns:a16="http://schemas.microsoft.com/office/drawing/2014/main" id="{D2BE09C2-5C87-4305-9822-9531B997427C}"/>
-              </a:ext>
-            </a:extLst>
-          </p:cNvPr>
-          <p:cNvSpPr/>
-          <p:nvPr/>
-        </p:nvSpPr>
-        <p:spPr>
-          <a:xfrm>
-            <a:off x="10124544" y="2373477"/>
-            <a:ext cx="152400" cy="276003"/>
-          </a:xfrm>
-          <a:prstGeom prst="rect">
-            <a:avLst/>
-          </a:prstGeom>
-          <a:solidFill>
-            <a:srgbClr val="0070C0"/>
-          </a:solidFill>
-          <a:ln>
-            <a:solidFill>
-              <a:srgbClr val="0070C0"/>
-            </a:solidFill>
-          </a:ln>
-          <a:effectLst/>
-        </p:spPr>
-        <p:style>
-          <a:lnRef idx="1">
-            <a:schemeClr val="accent3"/>
-          </a:lnRef>
-          <a:fillRef idx="2">
-            <a:schemeClr val="accent3"/>
-          </a:fillRef>
-          <a:effectRef idx="1">
-            <a:schemeClr val="accent3"/>
-          </a:effectRef>
-          <a:fontRef idx="minor">
-            <a:schemeClr val="dk1"/>
-          </a:fontRef>
-        </p:style>
-        <p:txBody>
-          <a:bodyPr rtlCol="0" anchor="ctr"/>
-          <a:lstStyle/>
-          <a:p>
-            <a:pPr algn="ctr"/>
-            <a:endParaRPr lang="en-SG" sz="1400"/>
-          </a:p>
-        </p:txBody>
-      </p:sp>
-      <p:sp>
-        <p:nvSpPr>
-          <p:cNvPr id="55" name="Rectangle 62">
-            <a:extLst>
-              <a:ext uri="{FF2B5EF4-FFF2-40B4-BE49-F238E27FC236}">
-                <a16:creationId xmlns:a16="http://schemas.microsoft.com/office/drawing/2014/main" id="{0F396278-EF7A-4EDC-8AD1-8EE5D0DA22AC}"/>
-              </a:ext>
-            </a:extLst>
-          </p:cNvPr>
-          <p:cNvSpPr/>
-          <p:nvPr/>
-        </p:nvSpPr>
-        <p:spPr>
-          <a:xfrm>
-            <a:off x="9540906" y="2032250"/>
-            <a:ext cx="1330346" cy="385338"/>
-          </a:xfrm>
-          <a:prstGeom prst="rect">
-            <a:avLst/>
-          </a:prstGeom>
-          <a:solidFill>
-            <a:srgbClr val="0070C0"/>
-          </a:solidFill>
-          <a:ln w="19050">
-            <a:solidFill>
-              <a:srgbClr val="0070C0"/>
-            </a:solidFill>
-          </a:ln>
-          <a:effectLst/>
-        </p:spPr>
-        <p:style>
-          <a:lnRef idx="1">
-            <a:schemeClr val="accent2"/>
-          </a:lnRef>
-          <a:fillRef idx="2">
-            <a:schemeClr val="accent2"/>
-          </a:fillRef>
-          <a:effectRef idx="1">
-            <a:schemeClr val="accent2"/>
-          </a:effectRef>
-          <a:fontRef idx="minor">
-            <a:schemeClr val="dk1"/>
-          </a:fontRef>
-        </p:style>
-        <p:txBody>
-          <a:bodyPr rtlCol="0" anchor="ctr"/>
-          <a:lstStyle/>
-          <a:p>
-            <a:pPr algn="ctr"/>
-            <a:r>
-              <a:rPr lang="en-US" sz="1600" dirty="0">
-                <a:solidFill>
-                  <a:schemeClr val="bg1"/>
-                </a:solidFill>
-              </a:rPr>
-              <a:t>g:Goal</a:t>
-            </a:r>
-            <a:endParaRPr lang="en-SG" sz="1600" dirty="0">
-              <a:solidFill>
-                <a:schemeClr val="bg1"/>
-              </a:solidFill>
-            </a:endParaRPr>
-          </a:p>
-        </p:txBody>
-      </p:sp>
-      <p:cxnSp>
-        <p:nvCxnSpPr>
-          <p:cNvPr id="57" name="Straight Arrow Connector 56">
-            <a:extLst>
-              <a:ext uri="{FF2B5EF4-FFF2-40B4-BE49-F238E27FC236}">
-                <a16:creationId xmlns:a16="http://schemas.microsoft.com/office/drawing/2014/main" id="{DFAC7711-44EE-40C4-84B5-C679845F3B6A}"/>
-              </a:ext>
-            </a:extLst>
-          </p:cNvPr>
-          <p:cNvCxnSpPr>
-            <a:cxnSpLocks/>
-            <a:endCxn id="55" idx="1"/>
-          </p:cNvCxnSpPr>
-          <p:nvPr/>
-        </p:nvCxnSpPr>
-        <p:spPr>
-          <a:xfrm flipV="1">
-            <a:off x="8441112" y="2224919"/>
-            <a:ext cx="1099799" cy="11142"/>
-          </a:xfrm>
-          <a:prstGeom prst="straightConnector1">
-            <a:avLst/>
-          </a:prstGeom>
-          <a:ln w="19050">
-            <a:solidFill>
-              <a:srgbClr val="0070C0"/>
-            </a:solidFill>
-            <a:tailEnd type="arrow"/>
-          </a:ln>
-        </p:spPr>
-        <p:style>
-          <a:lnRef idx="1">
-            <a:schemeClr val="accent1"/>
-          </a:lnRef>
-          <a:fillRef idx="0">
-            <a:schemeClr val="accent1"/>
-          </a:fillRef>
-          <a:effectRef idx="0">
-            <a:schemeClr val="accent1"/>
-          </a:effectRef>
-          <a:fontRef idx="minor">
-            <a:schemeClr val="tx1"/>
-          </a:fontRef>
-        </p:style>
-      </p:cxnSp>
-      <p:cxnSp>
-        <p:nvCxnSpPr>
-          <p:cNvPr id="58" name="Straight Arrow Connector 57">
-            <a:extLst>
-              <a:ext uri="{FF2B5EF4-FFF2-40B4-BE49-F238E27FC236}">
-                <a16:creationId xmlns:a16="http://schemas.microsoft.com/office/drawing/2014/main" id="{6FE3667C-5D7B-40FC-A811-9C500B20AB16}"/>
-              </a:ext>
-            </a:extLst>
-          </p:cNvPr>
-          <p:cNvCxnSpPr>
-            <a:cxnSpLocks/>
-          </p:cNvCxnSpPr>
-          <p:nvPr/>
-        </p:nvCxnSpPr>
-        <p:spPr>
-          <a:xfrm flipV="1">
-            <a:off x="8462183" y="2644903"/>
-            <a:ext cx="1732479" cy="3210"/>
-          </a:xfrm>
-          <a:prstGeom prst="straightConnector1">
-            <a:avLst/>
-          </a:prstGeom>
-          <a:ln w="19050">
-            <a:solidFill>
-              <a:srgbClr val="0070C0"/>
-            </a:solidFill>
-            <a:prstDash val="sysDash"/>
-            <a:headEnd type="arrow" w="med" len="med"/>
-            <a:tailEnd type="none" w="med" len="med"/>
-          </a:ln>
-        </p:spPr>
-        <p:style>
-          <a:lnRef idx="1">
-            <a:schemeClr val="accent1"/>
-          </a:lnRef>
-          <a:fillRef idx="0">
-            <a:schemeClr val="accent1"/>
-          </a:fillRef>
-          <a:effectRef idx="0">
-            <a:schemeClr val="accent1"/>
-          </a:effectRef>
-          <a:fontRef idx="minor">
-            <a:schemeClr val="tx1"/>
-          </a:fontRef>
-        </p:style>
-      </p:cxnSp>
-      <p:sp>
-        <p:nvSpPr>
-          <p:cNvPr id="59" name="Rectangle 58">
-            <a:extLst>
-              <a:ext uri="{FF2B5EF4-FFF2-40B4-BE49-F238E27FC236}">
-                <a16:creationId xmlns:a16="http://schemas.microsoft.com/office/drawing/2014/main" id="{89A4C19F-4221-4C46-B252-532A32FDF6DB}"/>
-              </a:ext>
-            </a:extLst>
-          </p:cNvPr>
-          <p:cNvSpPr/>
-          <p:nvPr/>
-        </p:nvSpPr>
-        <p:spPr>
-          <a:xfrm>
-            <a:off x="10121840" y="3260016"/>
-            <a:ext cx="152400" cy="276003"/>
-          </a:xfrm>
-          <a:prstGeom prst="rect">
-            <a:avLst/>
-          </a:prstGeom>
-          <a:solidFill>
-            <a:srgbClr val="0070C0"/>
-          </a:solidFill>
-          <a:ln>
-            <a:solidFill>
-              <a:srgbClr val="0070C0"/>
-            </a:solidFill>
-          </a:ln>
-          <a:effectLst/>
-        </p:spPr>
-        <p:style>
-          <a:lnRef idx="1">
-            <a:schemeClr val="accent3"/>
-          </a:lnRef>
-          <a:fillRef idx="2">
-            <a:schemeClr val="accent3"/>
-          </a:fillRef>
-          <a:effectRef idx="1">
-            <a:schemeClr val="accent3"/>
-          </a:effectRef>
-          <a:fontRef idx="minor">
-            <a:schemeClr val="dk1"/>
-          </a:fontRef>
-        </p:style>
-        <p:txBody>
-          <a:bodyPr rtlCol="0" anchor="ctr"/>
-          <a:lstStyle/>
-          <a:p>
-            <a:pPr algn="ctr"/>
-            <a:endParaRPr lang="en-SG" sz="1400"/>
-          </a:p>
-        </p:txBody>
-      </p:sp>
-      <p:sp>
-        <p:nvSpPr>
-          <p:cNvPr id="61" name="Rectangle 62">
-            <a:extLst>
-              <a:ext uri="{FF2B5EF4-FFF2-40B4-BE49-F238E27FC236}">
-                <a16:creationId xmlns:a16="http://schemas.microsoft.com/office/drawing/2014/main" id="{5EA1181C-5AE5-44DA-AF4F-EEE8B279B312}"/>
-              </a:ext>
-            </a:extLst>
-          </p:cNvPr>
-          <p:cNvSpPr/>
-          <p:nvPr/>
-        </p:nvSpPr>
-        <p:spPr>
-          <a:xfrm>
-            <a:off x="9270317" y="2879330"/>
-            <a:ext cx="1848689" cy="461538"/>
-          </a:xfrm>
-          <a:prstGeom prst="rect">
-            <a:avLst/>
-          </a:prstGeom>
-          <a:solidFill>
-            <a:srgbClr val="0070C0"/>
-          </a:solidFill>
-          <a:ln w="19050">
-            <a:solidFill>
-              <a:srgbClr val="0070C0"/>
-            </a:solidFill>
-          </a:ln>
-          <a:effectLst/>
-        </p:spPr>
-        <p:style>
-          <a:lnRef idx="1">
-            <a:schemeClr val="accent2"/>
-          </a:lnRef>
-          <a:fillRef idx="2">
-            <a:schemeClr val="accent2"/>
-          </a:fillRef>
-          <a:effectRef idx="1">
-            <a:schemeClr val="accent2"/>
-          </a:effectRef>
-          <a:fontRef idx="minor">
-            <a:schemeClr val="dk1"/>
-          </a:fontRef>
-        </p:style>
-        <p:txBody>
-          <a:bodyPr rtlCol="0" anchor="ctr"/>
-          <a:lstStyle/>
-          <a:p>
-            <a:pPr algn="ctr"/>
-            <a:r>
-              <a:rPr lang="en-US" sz="1600" dirty="0">
-                <a:solidFill>
-                  <a:schemeClr val="bg1"/>
-                </a:solidFill>
-              </a:rPr>
-              <a:t>s:SetGoalCommand</a:t>
-            </a:r>
-            <a:endParaRPr lang="en-SG" sz="1600" dirty="0">
-              <a:solidFill>
-                <a:schemeClr val="bg1"/>
-              </a:solidFill>
-            </a:endParaRPr>
-          </a:p>
-        </p:txBody>
-      </p:sp>
-      <p:cxnSp>
-        <p:nvCxnSpPr>
-          <p:cNvPr id="62" name="Straight Arrow Connector 61">
-            <a:extLst>
-              <a:ext uri="{FF2B5EF4-FFF2-40B4-BE49-F238E27FC236}">
-                <a16:creationId xmlns:a16="http://schemas.microsoft.com/office/drawing/2014/main" id="{B21B13F1-4DC6-4F72-A101-88C694534280}"/>
-              </a:ext>
-            </a:extLst>
-          </p:cNvPr>
-          <p:cNvCxnSpPr>
-            <a:cxnSpLocks/>
-          </p:cNvCxnSpPr>
-          <p:nvPr/>
-        </p:nvCxnSpPr>
-        <p:spPr>
-          <a:xfrm flipV="1">
-            <a:off x="8449152" y="3010977"/>
-            <a:ext cx="801055" cy="8115"/>
-          </a:xfrm>
-          <a:prstGeom prst="straightConnector1">
-            <a:avLst/>
-          </a:prstGeom>
-          <a:ln w="19050">
-            <a:solidFill>
-              <a:srgbClr val="0070C0"/>
-            </a:solidFill>
-            <a:tailEnd type="arrow"/>
-          </a:ln>
-        </p:spPr>
-        <p:style>
-          <a:lnRef idx="1">
-            <a:schemeClr val="accent1"/>
-          </a:lnRef>
-          <a:fillRef idx="0">
-            <a:schemeClr val="accent1"/>
-          </a:fillRef>
-          <a:effectRef idx="0">
-            <a:schemeClr val="accent1"/>
-          </a:effectRef>
-          <a:fontRef idx="minor">
-            <a:schemeClr val="tx1"/>
-          </a:fontRef>
-        </p:style>
-      </p:cxnSp>
-      <p:cxnSp>
-        <p:nvCxnSpPr>
-          <p:cNvPr id="64" name="Straight Arrow Connector 63">
-            <a:extLst>
-              <a:ext uri="{FF2B5EF4-FFF2-40B4-BE49-F238E27FC236}">
-                <a16:creationId xmlns:a16="http://schemas.microsoft.com/office/drawing/2014/main" id="{BC96654F-40DD-44EB-893A-5E25F58F5A93}"/>
-              </a:ext>
-            </a:extLst>
-          </p:cNvPr>
-          <p:cNvCxnSpPr>
-            <a:cxnSpLocks/>
-          </p:cNvCxnSpPr>
-          <p:nvPr/>
-        </p:nvCxnSpPr>
-        <p:spPr>
-          <a:xfrm flipV="1">
-            <a:off x="8433544" y="3531829"/>
-            <a:ext cx="1732479" cy="3210"/>
-          </a:xfrm>
-          <a:prstGeom prst="straightConnector1">
-            <a:avLst/>
-          </a:prstGeom>
-          <a:ln w="19050">
-            <a:solidFill>
-              <a:srgbClr val="0070C0"/>
-            </a:solidFill>
-            <a:prstDash val="sysDash"/>
-            <a:headEnd type="arrow" w="med" len="med"/>
-            <a:tailEnd type="none" w="med" len="med"/>
-          </a:ln>
-        </p:spPr>
-        <p:style>
-          <a:lnRef idx="1">
-            <a:schemeClr val="accent1"/>
-          </a:lnRef>
-          <a:fillRef idx="0">
-            <a:schemeClr val="accent1"/>
-          </a:fillRef>
-          <a:effectRef idx="0">
-            <a:schemeClr val="accent1"/>
-          </a:effectRef>
-          <a:fontRef idx="minor">
-            <a:schemeClr val="tx1"/>
-          </a:fontRef>
-        </p:style>
-      </p:cxnSp>
-      <p:cxnSp>
-        <p:nvCxnSpPr>
-          <p:cNvPr id="68" name="Straight Arrow Connector 67">
-            <a:extLst>
-              <a:ext uri="{FF2B5EF4-FFF2-40B4-BE49-F238E27FC236}">
-                <a16:creationId xmlns:a16="http://schemas.microsoft.com/office/drawing/2014/main" id="{FE3863F3-CCE2-4E4C-8655-346FA37F2632}"/>
-              </a:ext>
-            </a:extLst>
-          </p:cNvPr>
-          <p:cNvCxnSpPr>
-            <a:cxnSpLocks/>
-          </p:cNvCxnSpPr>
-          <p:nvPr/>
-        </p:nvCxnSpPr>
-        <p:spPr>
-          <a:xfrm flipV="1">
-            <a:off x="6639866" y="3648762"/>
-            <a:ext cx="1732479" cy="3210"/>
-          </a:xfrm>
-          <a:prstGeom prst="straightConnector1">
-            <a:avLst/>
-          </a:prstGeom>
-          <a:ln w="19050">
-            <a:solidFill>
-              <a:srgbClr val="0070C0"/>
-            </a:solidFill>
-            <a:prstDash val="sysDash"/>
-            <a:headEnd type="arrow" w="med" len="med"/>
-            <a:tailEnd type="none" w="med" len="med"/>
-          </a:ln>
-        </p:spPr>
-        <p:style>
-          <a:lnRef idx="1">
-            <a:schemeClr val="accent1"/>
-          </a:lnRef>
-          <a:fillRef idx="0">
-            <a:schemeClr val="accent1"/>
-          </a:fillRef>
-          <a:effectRef idx="0">
-            <a:schemeClr val="accent1"/>
-          </a:effectRef>
-          <a:fontRef idx="minor">
-            <a:schemeClr val="tx1"/>
-          </a:fontRef>
-        </p:style>
-      </p:cxnSp>
-      <p:sp>
-        <p:nvSpPr>
-          <p:cNvPr id="70" name="TextBox 69">
-            <a:extLst>
-              <a:ext uri="{FF2B5EF4-FFF2-40B4-BE49-F238E27FC236}">
-                <a16:creationId xmlns:a16="http://schemas.microsoft.com/office/drawing/2014/main" id="{231FB3DF-61B2-4D25-A1C8-A75A41AFB658}"/>
-              </a:ext>
-            </a:extLst>
-          </p:cNvPr>
-          <p:cNvSpPr txBox="1"/>
-          <p:nvPr/>
-        </p:nvSpPr>
-        <p:spPr>
-          <a:xfrm>
-            <a:off x="6801349" y="3383210"/>
-            <a:ext cx="779662" cy="215444"/>
-          </a:xfrm>
-          <a:prstGeom prst="rect">
-            <a:avLst/>
-          </a:prstGeom>
-          <a:noFill/>
-        </p:spPr>
-        <p:txBody>
-          <a:bodyPr wrap="square" lIns="0" tIns="0" rIns="0" bIns="0" rtlCol="0">
-            <a:spAutoFit/>
-          </a:bodyPr>
-          <a:lstStyle>
-            <a:defPPr>
-              <a:defRPr lang="en-US"/>
-            </a:defPPr>
-            <a:lvl1pPr algn="r">
-              <a:defRPr sz="1400">
-                <a:solidFill>
-                  <a:srgbClr val="0070C0"/>
-                </a:solidFill>
-              </a:defRPr>
-            </a:lvl1pPr>
-          </a:lstStyle>
-          <a:p>
-            <a:r>
-              <a:rPr lang="en-US" dirty="0"/>
-              <a:t>s</a:t>
-            </a:r>
-          </a:p>
-        </p:txBody>
-      </p:sp>
-      <p:cxnSp>
-        <p:nvCxnSpPr>
-          <p:cNvPr id="71" name="Straight Connector 70">
-            <a:extLst>
-              <a:ext uri="{FF2B5EF4-FFF2-40B4-BE49-F238E27FC236}">
-                <a16:creationId xmlns:a16="http://schemas.microsoft.com/office/drawing/2014/main" id="{27557F21-81F4-4E01-9996-EEC807F58C00}"/>
-              </a:ext>
-            </a:extLst>
-          </p:cNvPr>
-          <p:cNvCxnSpPr>
-            <a:cxnSpLocks/>
-          </p:cNvCxnSpPr>
-          <p:nvPr/>
-        </p:nvCxnSpPr>
-        <p:spPr>
-          <a:xfrm>
-            <a:off x="10203185" y="3410430"/>
-            <a:ext cx="0" cy="2690302"/>
-          </a:xfrm>
-          <a:prstGeom prst="line">
-            <a:avLst/>
-          </a:prstGeom>
-          <a:ln w="19050">
-            <a:solidFill>
-              <a:srgbClr val="0070C0"/>
-            </a:solidFill>
-            <a:prstDash val="sysDash"/>
-          </a:ln>
-          <a:effectLst/>
-        </p:spPr>
-        <p:style>
-          <a:lnRef idx="1">
-            <a:schemeClr val="accent1"/>
-          </a:lnRef>
-          <a:fillRef idx="2">
-            <a:schemeClr val="accent1"/>
-          </a:fillRef>
-          <a:effectRef idx="1">
-            <a:schemeClr val="accent1"/>
-          </a:effectRef>
-          <a:fontRef idx="minor">
-            <a:schemeClr val="dk1"/>
-          </a:fontRef>
-        </p:style>
-      </p:cxnSp>
-      <p:sp>
-        <p:nvSpPr>
-          <p:cNvPr id="75" name="Rectangle 74">
-            <a:extLst>
-              <a:ext uri="{FF2B5EF4-FFF2-40B4-BE49-F238E27FC236}">
-                <a16:creationId xmlns:a16="http://schemas.microsoft.com/office/drawing/2014/main" id="{076BC29C-C92A-4216-9A35-54451B02249A}"/>
-              </a:ext>
-            </a:extLst>
-          </p:cNvPr>
-          <p:cNvSpPr/>
-          <p:nvPr/>
-        </p:nvSpPr>
-        <p:spPr>
-          <a:xfrm>
-            <a:off x="11409644" y="6083264"/>
-            <a:ext cx="152400" cy="276003"/>
-          </a:xfrm>
-          <a:prstGeom prst="rect">
-            <a:avLst/>
-          </a:prstGeom>
-          <a:solidFill>
-            <a:srgbClr val="0070C0"/>
-          </a:solidFill>
-          <a:ln>
-            <a:solidFill>
-              <a:srgbClr val="0070C0"/>
-            </a:solidFill>
-          </a:ln>
-          <a:effectLst/>
-        </p:spPr>
-        <p:style>
-          <a:lnRef idx="1">
-            <a:schemeClr val="accent3"/>
-          </a:lnRef>
-          <a:fillRef idx="2">
-            <a:schemeClr val="accent3"/>
-          </a:fillRef>
-          <a:effectRef idx="1">
-            <a:schemeClr val="accent3"/>
-          </a:effectRef>
-          <a:fontRef idx="minor">
-            <a:schemeClr val="dk1"/>
-          </a:fontRef>
-        </p:style>
-        <p:txBody>
-          <a:bodyPr rtlCol="0" anchor="ctr"/>
-          <a:lstStyle/>
-          <a:p>
-            <a:pPr algn="ctr"/>
-            <a:endParaRPr lang="en-SG" sz="1400"/>
-          </a:p>
-        </p:txBody>
-      </p:sp>
-      <p:sp>
-        <p:nvSpPr>
-          <p:cNvPr id="76" name="Rectangle 62">
-            <a:extLst>
-              <a:ext uri="{FF2B5EF4-FFF2-40B4-BE49-F238E27FC236}">
-                <a16:creationId xmlns:a16="http://schemas.microsoft.com/office/drawing/2014/main" id="{FA66D03F-6E37-485C-8486-452E48708909}"/>
-              </a:ext>
-            </a:extLst>
-          </p:cNvPr>
-          <p:cNvSpPr/>
-          <p:nvPr/>
-        </p:nvSpPr>
-        <p:spPr>
-          <a:xfrm>
-            <a:off x="10649961" y="5645284"/>
-            <a:ext cx="1600379" cy="491077"/>
-          </a:xfrm>
-          <a:prstGeom prst="rect">
-            <a:avLst/>
-          </a:prstGeom>
-          <a:solidFill>
-            <a:srgbClr val="0070C0"/>
-          </a:solidFill>
-          <a:ln w="19050">
-            <a:solidFill>
-              <a:srgbClr val="0070C0"/>
-            </a:solidFill>
-          </a:ln>
-          <a:effectLst/>
-        </p:spPr>
-        <p:style>
-          <a:lnRef idx="1">
-            <a:schemeClr val="accent2"/>
-          </a:lnRef>
-          <a:fillRef idx="2">
-            <a:schemeClr val="accent2"/>
-          </a:fillRef>
-          <a:effectRef idx="1">
-            <a:schemeClr val="accent2"/>
-          </a:effectRef>
-          <a:fontRef idx="minor">
-            <a:schemeClr val="dk1"/>
-          </a:fontRef>
-        </p:style>
-        <p:txBody>
-          <a:bodyPr rtlCol="0" anchor="ctr"/>
-          <a:lstStyle/>
-          <a:p>
-            <a:pPr algn="ctr"/>
-            <a:r>
               <a:rPr lang="en-US" sz="1600" dirty="0" err="1">
                 <a:solidFill>
                   <a:schemeClr val="bg1"/>
@@ -8036,7 +6075,7 @@
           <p:cNvPr id="77" name="Straight Arrow Connector 76">
             <a:extLst>
               <a:ext uri="{FF2B5EF4-FFF2-40B4-BE49-F238E27FC236}">
-                <a16:creationId xmlns:a16="http://schemas.microsoft.com/office/drawing/2014/main" id="{7D8EAD91-5DA8-4D4C-9578-3F1E81198DAF}"/>
+                <a16:creationId xmlns:a16="http://schemas.microsoft.com/office/drawing/2014/main" xmlns="" id="{7D8EAD91-5DA8-4D4C-9578-3F1E81198DAF}"/>
               </a:ext>
             </a:extLst>
           </p:cNvPr>
@@ -8080,7 +6119,7 @@
           <p:cNvPr id="85" name="Straight Arrow Connector 84">
             <a:extLst>
               <a:ext uri="{FF2B5EF4-FFF2-40B4-BE49-F238E27FC236}">
-                <a16:creationId xmlns:a16="http://schemas.microsoft.com/office/drawing/2014/main" id="{A5B4178D-4812-43C7-84F3-81C5C11ED80E}"/>
+                <a16:creationId xmlns:a16="http://schemas.microsoft.com/office/drawing/2014/main" xmlns="" id="{A5B4178D-4812-43C7-84F3-81C5C11ED80E}"/>
               </a:ext>
             </a:extLst>
           </p:cNvPr>

</xml_diff>